<commit_message>
Added presentation and link to Youtube video presentation.
</commit_message>
<xml_diff>
--- a/Stats6021Project2.pptx
+++ b/Stats6021Project2.pptx
@@ -5,25 +5,26 @@
     <p:sldMasterId id="2147483660" r:id="rId4"/>
   </p:sldMasterIdLst>
   <p:notesMasterIdLst>
-    <p:notesMasterId r:id="rId18"/>
+    <p:notesMasterId r:id="rId19"/>
   </p:notesMasterIdLst>
   <p:handoutMasterIdLst>
-    <p:handoutMasterId r:id="rId19"/>
+    <p:handoutMasterId r:id="rId20"/>
   </p:handoutMasterIdLst>
   <p:sldIdLst>
     <p:sldId id="256" r:id="rId5"/>
     <p:sldId id="271" r:id="rId6"/>
     <p:sldId id="283" r:id="rId7"/>
-    <p:sldId id="279" r:id="rId8"/>
-    <p:sldId id="281" r:id="rId9"/>
-    <p:sldId id="284" r:id="rId10"/>
-    <p:sldId id="285" r:id="rId11"/>
-    <p:sldId id="286" r:id="rId12"/>
-    <p:sldId id="287" r:id="rId13"/>
-    <p:sldId id="288" r:id="rId14"/>
-    <p:sldId id="290" r:id="rId15"/>
-    <p:sldId id="289" r:id="rId16"/>
-    <p:sldId id="291" r:id="rId17"/>
+    <p:sldId id="292" r:id="rId8"/>
+    <p:sldId id="279" r:id="rId9"/>
+    <p:sldId id="281" r:id="rId10"/>
+    <p:sldId id="284" r:id="rId11"/>
+    <p:sldId id="285" r:id="rId12"/>
+    <p:sldId id="286" r:id="rId13"/>
+    <p:sldId id="287" r:id="rId14"/>
+    <p:sldId id="288" r:id="rId15"/>
+    <p:sldId id="290" r:id="rId16"/>
+    <p:sldId id="289" r:id="rId17"/>
+    <p:sldId id="291" r:id="rId18"/>
   </p:sldIdLst>
   <p:sldSz cx="12192000" cy="6858000"/>
   <p:notesSz cx="6858000" cy="9144000"/>
@@ -134,6 +135,7 @@
           <p14:sldIdLst>
             <p14:sldId id="271"/>
             <p14:sldId id="283"/>
+            <p14:sldId id="292"/>
             <p14:sldId id="279"/>
             <p14:sldId id="281"/>
             <p14:sldId id="284"/>
@@ -260,7 +262,7 @@
           <a:p>
             <a:fld id="{80680FBE-A8DF-4758-9AC4-3A9E1039168F}" type="datetimeFigureOut">
               <a:rPr lang="en-US" smtClean="0"/>
-              <a:t>8/4/2020</a:t>
+              <a:t>8/6/2020</a:t>
             </a:fld>
             <a:endParaRPr lang="en-US" dirty="0"/>
           </a:p>
@@ -425,7 +427,7 @@
           <a:p>
             <a:fld id="{EC13577B-6902-467D-A26C-08A0DD5E4E03}" type="datetimeFigureOut">
               <a:rPr lang="en-US" smtClean="0"/>
-              <a:t>8/4/2020</a:t>
+              <a:t>8/6/2020</a:t>
             </a:fld>
             <a:endParaRPr lang="en-US" dirty="0"/>
           </a:p>
@@ -1220,7 +1222,7 @@
             <a:fld id="{8BEEBAAA-29B5-4AF5-BC5F-7E580C29002D}" type="datetimeFigureOut">
               <a:rPr lang="en-US" smtClean="0"/>
               <a:pPr/>
-              <a:t>8/4/2020</a:t>
+              <a:t>8/6/2020</a:t>
             </a:fld>
             <a:endParaRPr lang="en-US" dirty="0"/>
           </a:p>
@@ -1846,7 +1848,7 @@
             <a:fld id="{8BEEBAAA-29B5-4AF5-BC5F-7E580C29002D}" type="datetimeFigureOut">
               <a:rPr lang="en-US" smtClean="0"/>
               <a:pPr/>
-              <a:t>8/4/2020</a:t>
+              <a:t>8/6/2020</a:t>
             </a:fld>
             <a:endParaRPr lang="en-US" dirty="0"/>
           </a:p>
@@ -2371,39 +2373,7 @@
                   <a:schemeClr val="bg1"/>
                 </a:solidFill>
               </a:rPr>
-              <a:t>Team: </a:t>
-            </a:r>
-            <a:r>
-              <a:rPr lang="en-US" sz="2400" dirty="0" err="1">
-                <a:solidFill>
-                  <a:schemeClr val="bg1"/>
-                </a:solidFill>
-              </a:rPr>
-              <a:t>Niraja</a:t>
-            </a:r>
-            <a:r>
-              <a:rPr lang="en-US" sz="2400" dirty="0">
-                <a:solidFill>
-                  <a:schemeClr val="bg1"/>
-                </a:solidFill>
-              </a:rPr>
-              <a:t> </a:t>
-            </a:r>
-            <a:r>
-              <a:rPr lang="en-US" sz="2400" dirty="0" err="1">
-                <a:solidFill>
-                  <a:schemeClr val="bg1"/>
-                </a:solidFill>
-              </a:rPr>
-              <a:t>Bhidar</a:t>
-            </a:r>
-            <a:r>
-              <a:rPr lang="en-US" sz="2400" dirty="0">
-                <a:solidFill>
-                  <a:schemeClr val="bg1"/>
-                </a:solidFill>
-              </a:rPr>
-              <a:t>, Derek Banks, Jay Hombal, Ronak </a:t>
+              <a:t>Team: Niraja Bohidar, Derek Banks, Jay Hombal, Ronak </a:t>
             </a:r>
             <a:r>
               <a:rPr lang="en-US" sz="2400" dirty="0" err="1">
@@ -2694,6 +2664,634 @@
         </p:spPr>
         <p:txBody>
           <a:bodyPr>
+            <a:normAutofit/>
+          </a:bodyPr>
+          <a:lstStyle/>
+          <a:p>
+            <a:r>
+              <a:rPr lang="en-US" sz="2500" b="1" dirty="0">
+                <a:latin typeface="Segoe UI" panose="020B0502040204020203" pitchFamily="34" charset="0"/>
+                <a:cs typeface="Segoe UI" panose="020B0502040204020203" pitchFamily="34" charset="0"/>
+              </a:rPr>
+              <a:t>Initial MLR Model failed to satisfy regression assumptions</a:t>
+            </a:r>
+          </a:p>
+        </p:txBody>
+      </p:sp>
+      <mc:AlternateContent xmlns:mc="http://schemas.openxmlformats.org/markup-compatibility/2006" xmlns:a14="http://schemas.microsoft.com/office/drawing/2010/main">
+        <mc:Choice Requires="a14">
+          <p:sp>
+            <p:nvSpPr>
+              <p:cNvPr id="8" name="Rectangle 7">
+                <a:extLst>
+                  <a:ext uri="{FF2B5EF4-FFF2-40B4-BE49-F238E27FC236}">
+                    <a16:creationId xmlns:a16="http://schemas.microsoft.com/office/drawing/2014/main" id="{9FD228F1-303D-4AC1-81C8-20CDB3468B3B}"/>
+                  </a:ext>
+                </a:extLst>
+              </p:cNvPr>
+              <p:cNvSpPr/>
+              <p:nvPr/>
+            </p:nvSpPr>
+            <p:spPr>
+              <a:xfrm>
+                <a:off x="799472" y="1307337"/>
+                <a:ext cx="5508496" cy="743473"/>
+              </a:xfrm>
+              <a:prstGeom prst="rect">
+                <a:avLst/>
+              </a:prstGeom>
+            </p:spPr>
+            <p:txBody>
+              <a:bodyPr wrap="square">
+                <a:spAutoFit/>
+              </a:bodyPr>
+              <a:lstStyle/>
+              <a:p>
+                <a:pPr marL="285750" indent="-285750">
+                  <a:spcAft>
+                    <a:spcPts val="2000"/>
+                  </a:spcAft>
+                  <a:buFont typeface="Arial" panose="020B0604020202020204" pitchFamily="34" charset="0"/>
+                  <a:buChar char="•"/>
+                </a:pPr>
+                <a:r>
+                  <a:rPr lang="en-US" sz="1400" dirty="0">
+                    <a:solidFill>
+                      <a:prstClr val="black">
+                        <a:lumMod val="75000"/>
+                        <a:lumOff val="25000"/>
+                      </a:prstClr>
+                    </a:solidFill>
+                    <a:latin typeface="Segoe UI" panose="020B0502040204020203" pitchFamily="34" charset="0"/>
+                    <a:cs typeface="Segoe UI" panose="020B0502040204020203" pitchFamily="34" charset="0"/>
+                  </a:rPr>
+                  <a:t>We choose full model as our initial model </a:t>
+                </a:r>
+                <a:r>
+                  <a:rPr lang="en-US" sz="1400" dirty="0" err="1">
+                    <a:solidFill>
+                      <a:prstClr val="black">
+                        <a:lumMod val="75000"/>
+                        <a:lumOff val="25000"/>
+                      </a:prstClr>
+                    </a:solidFill>
+                    <a:latin typeface="Segoe UI" panose="020B0502040204020203" pitchFamily="34" charset="0"/>
+                    <a:cs typeface="Segoe UI" panose="020B0502040204020203" pitchFamily="34" charset="0"/>
+                  </a:rPr>
+                  <a:t>becasue</a:t>
+                </a:r>
+                <a:r>
+                  <a:rPr lang="en-US" sz="1400" dirty="0">
+                    <a:solidFill>
+                      <a:prstClr val="black">
+                        <a:lumMod val="75000"/>
+                        <a:lumOff val="25000"/>
+                      </a:prstClr>
+                    </a:solidFill>
+                    <a:latin typeface="Segoe UI" panose="020B0502040204020203" pitchFamily="34" charset="0"/>
+                    <a:cs typeface="Segoe UI" panose="020B0502040204020203" pitchFamily="34" charset="0"/>
+                  </a:rPr>
+                  <a:t> automatic search functions such as highest </a:t>
+                </a:r>
+                <a:r>
+                  <a:rPr lang="en-US" sz="1400" b="1" dirty="0">
+                    <a:solidFill>
+                      <a:srgbClr val="D24726"/>
+                    </a:solidFill>
+                    <a:latin typeface="Segoe UI" panose="020B0502040204020203" pitchFamily="34" charset="0"/>
+                    <a:cs typeface="Segoe UI" panose="020B0502040204020203" pitchFamily="34" charset="0"/>
+                  </a:rPr>
+                  <a:t>adjusted </a:t>
+                </a:r>
+                <a14:m>
+                  <m:oMath xmlns:m="http://schemas.openxmlformats.org/officeDocument/2006/math">
+                    <m:sSup>
+                      <m:sSupPr>
+                        <m:ctrlPr>
+                          <a:rPr lang="en-US" sz="1400" b="1" i="1" dirty="0" smtClean="0">
+                            <a:solidFill>
+                              <a:srgbClr val="D24726"/>
+                            </a:solidFill>
+                            <a:latin typeface="Cambria Math" panose="02040503050406030204" pitchFamily="18" charset="0"/>
+                            <a:cs typeface="Segoe UI" panose="020B0502040204020203" pitchFamily="34" charset="0"/>
+                          </a:rPr>
+                        </m:ctrlPr>
+                      </m:sSupPr>
+                      <m:e>
+                        <m:r>
+                          <a:rPr lang="en-US" sz="1400" b="1" i="1" dirty="0" smtClean="0">
+                            <a:solidFill>
+                              <a:srgbClr val="D24726"/>
+                            </a:solidFill>
+                            <a:latin typeface="Cambria Math" panose="02040503050406030204" pitchFamily="18" charset="0"/>
+                            <a:cs typeface="Segoe UI" panose="020B0502040204020203" pitchFamily="34" charset="0"/>
+                          </a:rPr>
+                          <m:t>𝑹</m:t>
+                        </m:r>
+                      </m:e>
+                      <m:sup>
+                        <m:r>
+                          <a:rPr lang="en-US" sz="1400" b="1" i="1" dirty="0" smtClean="0">
+                            <a:solidFill>
+                              <a:srgbClr val="D24726"/>
+                            </a:solidFill>
+                            <a:latin typeface="Cambria Math" panose="02040503050406030204" pitchFamily="18" charset="0"/>
+                            <a:cs typeface="Segoe UI" panose="020B0502040204020203" pitchFamily="34" charset="0"/>
+                          </a:rPr>
+                          <m:t>𝟐</m:t>
+                        </m:r>
+                      </m:sup>
+                    </m:sSup>
+                  </m:oMath>
+                </a14:m>
+                <a:r>
+                  <a:rPr lang="en-US" sz="1400" dirty="0">
+                    <a:solidFill>
+                      <a:prstClr val="black">
+                        <a:lumMod val="75000"/>
+                        <a:lumOff val="25000"/>
+                      </a:prstClr>
+                    </a:solidFill>
+                    <a:latin typeface="Segoe UI" panose="020B0502040204020203" pitchFamily="34" charset="0"/>
+                    <a:cs typeface="Segoe UI" panose="020B0502040204020203" pitchFamily="34" charset="0"/>
+                  </a:rPr>
+                  <a:t>  &amp; </a:t>
+                </a:r>
+                <a:r>
+                  <a:rPr lang="en-US" sz="1400" b="1" dirty="0">
+                    <a:solidFill>
+                      <a:srgbClr val="D24726"/>
+                    </a:solidFill>
+                    <a:latin typeface="Segoe UI" panose="020B0502040204020203" pitchFamily="34" charset="0"/>
+                    <a:cs typeface="Segoe UI" panose="020B0502040204020203" pitchFamily="34" charset="0"/>
+                  </a:rPr>
+                  <a:t>lowest BIC </a:t>
+                </a:r>
+                <a:r>
+                  <a:rPr lang="en-US" sz="1400" dirty="0">
+                    <a:solidFill>
+                      <a:prstClr val="black">
+                        <a:lumMod val="75000"/>
+                        <a:lumOff val="25000"/>
+                      </a:prstClr>
+                    </a:solidFill>
+                    <a:latin typeface="Segoe UI" panose="020B0502040204020203" pitchFamily="34" charset="0"/>
+                    <a:cs typeface="Segoe UI" panose="020B0502040204020203" pitchFamily="34" charset="0"/>
+                  </a:rPr>
+                  <a:t>results were different : </a:t>
+                </a:r>
+              </a:p>
+            </p:txBody>
+          </p:sp>
+        </mc:Choice>
+        <mc:Fallback xmlns="">
+          <p:sp>
+            <p:nvSpPr>
+              <p:cNvPr id="8" name="Rectangle 7">
+                <a:extLst>
+                  <a:ext uri="{FF2B5EF4-FFF2-40B4-BE49-F238E27FC236}">
+                    <a16:creationId xmlns:a16="http://schemas.microsoft.com/office/drawing/2014/main" id="{9FD228F1-303D-4AC1-81C8-20CDB3468B3B}"/>
+                  </a:ext>
+                </a:extLst>
+              </p:cNvPr>
+              <p:cNvSpPr>
+                <a:spLocks noRot="1" noChangeAspect="1" noMove="1" noResize="1" noEditPoints="1" noAdjustHandles="1" noChangeArrowheads="1" noChangeShapeType="1" noTextEdit="1"/>
+              </p:cNvSpPr>
+              <p:nvPr/>
+            </p:nvSpPr>
+            <p:spPr>
+              <a:xfrm>
+                <a:off x="799472" y="1307337"/>
+                <a:ext cx="5508496" cy="743473"/>
+              </a:xfrm>
+              <a:prstGeom prst="rect">
+                <a:avLst/>
+              </a:prstGeom>
+              <a:blipFill>
+                <a:blip r:embed="rId2"/>
+                <a:stretch>
+                  <a:fillRect l="-111" t="-1639" b="-7377"/>
+                </a:stretch>
+              </a:blipFill>
+            </p:spPr>
+            <p:txBody>
+              <a:bodyPr/>
+              <a:lstStyle/>
+              <a:p>
+                <a:r>
+                  <a:rPr lang="en-US">
+                    <a:noFill/>
+                  </a:rPr>
+                  <a:t> </a:t>
+                </a:r>
+              </a:p>
+            </p:txBody>
+          </p:sp>
+        </mc:Fallback>
+      </mc:AlternateContent>
+      <p:pic>
+        <p:nvPicPr>
+          <p:cNvPr id="4" name="Picture 3">
+            <a:extLst>
+              <a:ext uri="{FF2B5EF4-FFF2-40B4-BE49-F238E27FC236}">
+                <a16:creationId xmlns:a16="http://schemas.microsoft.com/office/drawing/2014/main" id="{A5B13257-D272-43C2-A19A-A8F0EA9FE153}"/>
+              </a:ext>
+            </a:extLst>
+          </p:cNvPr>
+          <p:cNvPicPr>
+            <a:picLocks noChangeAspect="1"/>
+          </p:cNvPicPr>
+          <p:nvPr/>
+        </p:nvPicPr>
+        <p:blipFill>
+          <a:blip r:embed="rId3"/>
+          <a:stretch>
+            <a:fillRect/>
+          </a:stretch>
+        </p:blipFill>
+        <p:spPr>
+          <a:xfrm>
+            <a:off x="6920672" y="1508528"/>
+            <a:ext cx="4099883" cy="3463371"/>
+          </a:xfrm>
+          <a:prstGeom prst="rect">
+            <a:avLst/>
+          </a:prstGeom>
+        </p:spPr>
+      </p:pic>
+      <p:sp>
+        <p:nvSpPr>
+          <p:cNvPr id="17" name="TextBox 16">
+            <a:extLst>
+              <a:ext uri="{FF2B5EF4-FFF2-40B4-BE49-F238E27FC236}">
+                <a16:creationId xmlns:a16="http://schemas.microsoft.com/office/drawing/2014/main" id="{73DED339-C5AA-4512-82B2-2668600B63F2}"/>
+              </a:ext>
+            </a:extLst>
+          </p:cNvPr>
+          <p:cNvSpPr txBox="1"/>
+          <p:nvPr/>
+        </p:nvSpPr>
+        <p:spPr>
+          <a:xfrm>
+            <a:off x="6139221" y="5163807"/>
+            <a:ext cx="5871863" cy="1169551"/>
+          </a:xfrm>
+          <a:prstGeom prst="rect">
+            <a:avLst/>
+          </a:prstGeom>
+          <a:noFill/>
+        </p:spPr>
+        <p:txBody>
+          <a:bodyPr wrap="square" rtlCol="0">
+            <a:spAutoFit/>
+          </a:bodyPr>
+          <a:lstStyle/>
+          <a:p>
+            <a:r>
+              <a:rPr lang="en-US" sz="1400" dirty="0">
+                <a:solidFill>
+                  <a:schemeClr val="tx1">
+                    <a:lumMod val="65000"/>
+                    <a:lumOff val="35000"/>
+                  </a:schemeClr>
+                </a:solidFill>
+              </a:rPr>
+              <a:t>From the plots, we can infer that our transformed model</a:t>
+            </a:r>
+          </a:p>
+          <a:p>
+            <a:pPr marL="285750" indent="-285750">
+              <a:buFont typeface="Arial" panose="020B0604020202020204" pitchFamily="34" charset="0"/>
+              <a:buChar char="•"/>
+            </a:pPr>
+            <a:r>
+              <a:rPr lang="en-US" sz="1400" dirty="0">
+                <a:solidFill>
+                  <a:schemeClr val="tx1">
+                    <a:lumMod val="65000"/>
+                    <a:lumOff val="35000"/>
+                  </a:schemeClr>
+                </a:solidFill>
+              </a:rPr>
+              <a:t>We can see </a:t>
+            </a:r>
+            <a:r>
+              <a:rPr lang="en-US" sz="1400" b="1" dirty="0">
+                <a:solidFill>
+                  <a:srgbClr val="D24726"/>
+                </a:solidFill>
+              </a:rPr>
+              <a:t>Non-constant variance </a:t>
+            </a:r>
+            <a:r>
+              <a:rPr lang="en-US" sz="1400" dirty="0">
+                <a:solidFill>
+                  <a:schemeClr val="tx1">
+                    <a:lumMod val="65000"/>
+                    <a:lumOff val="35000"/>
+                  </a:schemeClr>
+                </a:solidFill>
+              </a:rPr>
+              <a:t>as seen in the box-cox plot.</a:t>
+            </a:r>
+          </a:p>
+          <a:p>
+            <a:pPr marL="285750" indent="-285750">
+              <a:buFont typeface="Arial" panose="020B0604020202020204" pitchFamily="34" charset="0"/>
+              <a:buChar char="•"/>
+            </a:pPr>
+            <a:r>
+              <a:rPr lang="en-US" sz="1400" dirty="0">
+                <a:solidFill>
+                  <a:schemeClr val="tx1">
+                    <a:lumMod val="65000"/>
+                    <a:lumOff val="35000"/>
+                  </a:schemeClr>
+                </a:solidFill>
+              </a:rPr>
+              <a:t>And </a:t>
+            </a:r>
+            <a:r>
+              <a:rPr lang="en-US" sz="1400" b="1" dirty="0">
+                <a:solidFill>
+                  <a:srgbClr val="D24726"/>
+                </a:solidFill>
+              </a:rPr>
+              <a:t>Non-linear relationship</a:t>
+            </a:r>
+            <a:r>
+              <a:rPr lang="en-US" sz="1400" dirty="0">
+                <a:solidFill>
+                  <a:srgbClr val="D24726"/>
+                </a:solidFill>
+              </a:rPr>
+              <a:t> </a:t>
+            </a:r>
+            <a:r>
+              <a:rPr lang="en-US" sz="1400" dirty="0">
+                <a:solidFill>
+                  <a:schemeClr val="tx1">
+                    <a:lumMod val="65000"/>
+                    <a:lumOff val="35000"/>
+                  </a:schemeClr>
+                </a:solidFill>
+              </a:rPr>
+              <a:t>between y &amp; </a:t>
+            </a:r>
+            <a:r>
+              <a:rPr lang="en-US" sz="1400" dirty="0" err="1">
+                <a:solidFill>
+                  <a:schemeClr val="tx1">
+                    <a:lumMod val="65000"/>
+                    <a:lumOff val="35000"/>
+                  </a:schemeClr>
+                </a:solidFill>
+              </a:rPr>
+              <a:t>Xs</a:t>
+            </a:r>
+            <a:r>
+              <a:rPr lang="en-US" sz="1400" dirty="0">
+                <a:solidFill>
+                  <a:schemeClr val="tx1">
+                    <a:lumMod val="65000"/>
+                    <a:lumOff val="35000"/>
+                  </a:schemeClr>
+                </a:solidFill>
+              </a:rPr>
+              <a:t> is seen in the residual plot.</a:t>
+            </a:r>
+          </a:p>
+          <a:p>
+            <a:pPr marL="285750" indent="-285750">
+              <a:buFont typeface="Arial" panose="020B0604020202020204" pitchFamily="34" charset="0"/>
+              <a:buChar char="•"/>
+            </a:pPr>
+            <a:r>
+              <a:rPr lang="en-US" sz="1400" b="1" dirty="0">
+                <a:solidFill>
+                  <a:srgbClr val="D24726"/>
+                </a:solidFill>
+              </a:rPr>
+              <a:t>Heavy tails </a:t>
+            </a:r>
+            <a:r>
+              <a:rPr lang="en-US" sz="1400" dirty="0">
+                <a:solidFill>
+                  <a:schemeClr val="tx1">
+                    <a:lumMod val="65000"/>
+                    <a:lumOff val="35000"/>
+                  </a:schemeClr>
+                </a:solidFill>
+              </a:rPr>
+              <a:t>in normal Q-Q plot indicate the data is skewed.</a:t>
+            </a:r>
+          </a:p>
+        </p:txBody>
+      </p:sp>
+      <p:sp>
+        <p:nvSpPr>
+          <p:cNvPr id="20" name="TextBox 19">
+            <a:extLst>
+              <a:ext uri="{FF2B5EF4-FFF2-40B4-BE49-F238E27FC236}">
+                <a16:creationId xmlns:a16="http://schemas.microsoft.com/office/drawing/2014/main" id="{ED73FA6D-4A29-4572-B898-998968CB6A90}"/>
+              </a:ext>
+            </a:extLst>
+          </p:cNvPr>
+          <p:cNvSpPr txBox="1"/>
+          <p:nvPr/>
+        </p:nvSpPr>
+        <p:spPr>
+          <a:xfrm>
+            <a:off x="756378" y="5756758"/>
+            <a:ext cx="5259168" cy="738664"/>
+          </a:xfrm>
+          <a:prstGeom prst="rect">
+            <a:avLst/>
+          </a:prstGeom>
+          <a:noFill/>
+        </p:spPr>
+        <p:txBody>
+          <a:bodyPr wrap="square" rtlCol="0">
+            <a:spAutoFit/>
+          </a:bodyPr>
+          <a:lstStyle/>
+          <a:p>
+            <a:r>
+              <a:rPr lang="en-US" sz="1400" dirty="0">
+                <a:solidFill>
+                  <a:schemeClr val="tx1">
+                    <a:lumMod val="65000"/>
+                    <a:lumOff val="35000"/>
+                  </a:schemeClr>
+                </a:solidFill>
+              </a:rPr>
+              <a:t>We need to transform y to address </a:t>
+            </a:r>
+            <a:r>
+              <a:rPr lang="en-US" sz="1400" b="1" dirty="0">
+                <a:solidFill>
+                  <a:srgbClr val="D24726"/>
+                </a:solidFill>
+              </a:rPr>
+              <a:t>Non-constant variance </a:t>
+            </a:r>
+            <a:r>
+              <a:rPr lang="en-US" sz="1400" dirty="0">
+                <a:solidFill>
+                  <a:schemeClr val="tx1">
+                    <a:lumMod val="65000"/>
+                    <a:lumOff val="35000"/>
+                  </a:schemeClr>
+                </a:solidFill>
+              </a:rPr>
+              <a:t> then test assumptions again, transform x to address </a:t>
+            </a:r>
+            <a:r>
+              <a:rPr lang="en-US" sz="1400" b="1" dirty="0">
+                <a:solidFill>
+                  <a:srgbClr val="D24726"/>
+                </a:solidFill>
+              </a:rPr>
+              <a:t>Non-linearity</a:t>
+            </a:r>
+            <a:r>
+              <a:rPr lang="en-US" sz="1400" dirty="0">
+                <a:solidFill>
+                  <a:srgbClr val="D24726"/>
+                </a:solidFill>
+              </a:rPr>
+              <a:t> </a:t>
+            </a:r>
+            <a:r>
+              <a:rPr lang="en-US" sz="1400" dirty="0">
+                <a:solidFill>
+                  <a:schemeClr val="tx1">
+                    <a:lumMod val="65000"/>
+                    <a:lumOff val="35000"/>
+                  </a:schemeClr>
+                </a:solidFill>
+              </a:rPr>
+              <a:t>if it is still an issue</a:t>
+            </a:r>
+          </a:p>
+        </p:txBody>
+      </p:sp>
+      <p:pic>
+        <p:nvPicPr>
+          <p:cNvPr id="22" name="Picture 21">
+            <a:extLst>
+              <a:ext uri="{FF2B5EF4-FFF2-40B4-BE49-F238E27FC236}">
+                <a16:creationId xmlns:a16="http://schemas.microsoft.com/office/drawing/2014/main" id="{4F0FB3BA-B190-4939-B6C2-4B1AB085C00E}"/>
+              </a:ext>
+            </a:extLst>
+          </p:cNvPr>
+          <p:cNvPicPr>
+            <a:picLocks noChangeAspect="1"/>
+          </p:cNvPicPr>
+          <p:nvPr/>
+        </p:nvPicPr>
+        <p:blipFill>
+          <a:blip r:embed="rId4"/>
+          <a:stretch>
+            <a:fillRect/>
+          </a:stretch>
+        </p:blipFill>
+        <p:spPr>
+          <a:xfrm>
+            <a:off x="521207" y="2100243"/>
+            <a:ext cx="5981507" cy="499067"/>
+          </a:xfrm>
+          <a:prstGeom prst="rect">
+            <a:avLst/>
+          </a:prstGeom>
+        </p:spPr>
+      </p:pic>
+      <p:pic>
+        <p:nvPicPr>
+          <p:cNvPr id="24" name="Picture 23">
+            <a:extLst>
+              <a:ext uri="{FF2B5EF4-FFF2-40B4-BE49-F238E27FC236}">
+                <a16:creationId xmlns:a16="http://schemas.microsoft.com/office/drawing/2014/main" id="{3BAEAB8D-E8C6-4046-B6A3-7064A4137357}"/>
+              </a:ext>
+            </a:extLst>
+          </p:cNvPr>
+          <p:cNvPicPr>
+            <a:picLocks noChangeAspect="1"/>
+          </p:cNvPicPr>
+          <p:nvPr/>
+        </p:nvPicPr>
+        <p:blipFill>
+          <a:blip r:embed="rId5"/>
+          <a:stretch>
+            <a:fillRect/>
+          </a:stretch>
+        </p:blipFill>
+        <p:spPr>
+          <a:xfrm>
+            <a:off x="1356059" y="2693370"/>
+            <a:ext cx="3783568" cy="2852278"/>
+          </a:xfrm>
+          <a:prstGeom prst="rect">
+            <a:avLst/>
+          </a:prstGeom>
+        </p:spPr>
+      </p:pic>
+    </p:spTree>
+    <p:extLst>
+      <p:ext uri="{BB962C8B-B14F-4D97-AF65-F5344CB8AC3E}">
+        <p14:creationId xmlns:p14="http://schemas.microsoft.com/office/powerpoint/2010/main" val="517865610"/>
+      </p:ext>
+    </p:extLst>
+  </p:cSld>
+  <p:clrMapOvr>
+    <a:masterClrMapping/>
+  </p:clrMapOvr>
+  <mc:AlternateContent xmlns:mc="http://schemas.openxmlformats.org/markup-compatibility/2006" xmlns:p14="http://schemas.microsoft.com/office/powerpoint/2010/main">
+    <mc:Choice Requires="p14">
+      <p:transition p14:dur="10"/>
+    </mc:Choice>
+    <mc:Fallback xmlns="">
+      <p:transition/>
+    </mc:Fallback>
+  </mc:AlternateContent>
+</p:sld>
+</file>
+
+<file path=ppt/slides/slide11.xml><?xml version="1.0" encoding="utf-8"?>
+<p:sld xmlns:a="http://schemas.openxmlformats.org/drawingml/2006/main" xmlns:r="http://schemas.openxmlformats.org/officeDocument/2006/relationships" xmlns:p="http://schemas.openxmlformats.org/presentationml/2006/main">
+  <p:cSld>
+    <p:spTree>
+      <p:nvGrpSpPr>
+        <p:cNvPr id="1" name=""/>
+        <p:cNvGrpSpPr/>
+        <p:nvPr/>
+      </p:nvGrpSpPr>
+      <p:grpSpPr>
+        <a:xfrm>
+          <a:off x="0" y="0"/>
+          <a:ext cx="0" cy="0"/>
+          <a:chOff x="0" y="0"/>
+          <a:chExt cx="0" cy="0"/>
+        </a:xfrm>
+      </p:grpSpPr>
+      <p:sp>
+        <p:nvSpPr>
+          <p:cNvPr id="3" name="Title 2"/>
+          <p:cNvSpPr>
+            <a:spLocks noGrp="1"/>
+          </p:cNvSpPr>
+          <p:nvPr>
+            <p:ph type="title"/>
+          </p:nvPr>
+        </p:nvSpPr>
+        <p:spPr>
+          <a:xfrm>
+            <a:off x="521207" y="448056"/>
+            <a:ext cx="11236028" cy="640080"/>
+          </a:xfrm>
+        </p:spPr>
+        <p:txBody>
+          <a:bodyPr>
             <a:normAutofit fontScale="90000"/>
           </a:bodyPr>
           <a:lstStyle/>
@@ -2753,7 +3351,7 @@
                 <a:latin typeface="Segoe UI" panose="020B0502040204020203" pitchFamily="34" charset="0"/>
                 <a:cs typeface="Segoe UI" panose="020B0502040204020203" pitchFamily="34" charset="0"/>
               </a:rPr>
-              <a:t>First, we choose to transform the response variable to address the non-constant variance.</a:t>
+              <a:t>First, we choose to transform the response variable to attempt address the non-constant variance.</a:t>
             </a:r>
           </a:p>
           <a:p>
@@ -3036,21 +3634,18 @@
                 <a:latin typeface="Segoe UI" panose="020B0502040204020203" pitchFamily="34" charset="0"/>
                 <a:cs typeface="Segoe UI" panose="020B0502040204020203" pitchFamily="34" charset="0"/>
               </a:rPr>
-              <a:t>Variance is constant </a:t>
-            </a:r>
-            <a:r>
-              <a:rPr lang="en-US" sz="1200" dirty="0">
-                <a:solidFill>
-                  <a:schemeClr val="tx1">
-                    <a:lumMod val="65000"/>
-                    <a:lumOff val="35000"/>
-                  </a:schemeClr>
-                </a:solidFill>
-                <a:latin typeface="Segoe UI" panose="020B0502040204020203" pitchFamily="34" charset="0"/>
-                <a:cs typeface="Segoe UI" panose="020B0502040204020203" pitchFamily="34" charset="0"/>
-              </a:rPr>
-              <a:t>as seen in the box-cox plot</a:t>
-            </a:r>
+              <a:t>Variance is still not constant</a:t>
+            </a:r>
+            <a:endParaRPr lang="en-US" sz="1200" dirty="0">
+              <a:solidFill>
+                <a:schemeClr val="tx1">
+                  <a:lumMod val="65000"/>
+                  <a:lumOff val="35000"/>
+                </a:schemeClr>
+              </a:solidFill>
+              <a:latin typeface="Segoe UI" panose="020B0502040204020203" pitchFamily="34" charset="0"/>
+              <a:cs typeface="Segoe UI" panose="020B0502040204020203" pitchFamily="34" charset="0"/>
+            </a:endParaRPr>
           </a:p>
           <a:p>
             <a:pPr marL="285750" indent="-285750">
@@ -3271,7 +3866,7 @@
         </p:blipFill>
         <p:spPr>
           <a:xfrm>
-            <a:off x="5872059" y="3924874"/>
+            <a:off x="6052376" y="3924874"/>
             <a:ext cx="2631000" cy="2562324"/>
           </a:xfrm>
           <a:prstGeom prst="rect">
@@ -3361,7 +3956,7 @@
         </p:blipFill>
         <p:spPr>
           <a:xfrm>
-            <a:off x="8726596" y="3924874"/>
+            <a:off x="8788920" y="3924874"/>
             <a:ext cx="2968315" cy="2562324"/>
           </a:xfrm>
           <a:prstGeom prst="rect">
@@ -3390,7 +3985,7 @@
 </p:sld>
 </file>
 
-<file path=ppt/slides/slide11.xml><?xml version="1.0" encoding="utf-8"?>
+<file path=ppt/slides/slide12.xml><?xml version="1.0" encoding="utf-8"?>
 <p:sld xmlns:a="http://schemas.openxmlformats.org/drawingml/2006/main" xmlns:r="http://schemas.openxmlformats.org/officeDocument/2006/relationships" xmlns:p="http://schemas.openxmlformats.org/presentationml/2006/main">
   <p:cSld>
     <p:spTree>
@@ -3912,377 +4507,6 @@
 </p:sld>
 </file>
 
-<file path=ppt/slides/slide12.xml><?xml version="1.0" encoding="utf-8"?>
-<p:sld xmlns:a="http://schemas.openxmlformats.org/drawingml/2006/main" xmlns:r="http://schemas.openxmlformats.org/officeDocument/2006/relationships" xmlns:p="http://schemas.openxmlformats.org/presentationml/2006/main">
-  <p:cSld>
-    <p:spTree>
-      <p:nvGrpSpPr>
-        <p:cNvPr id="1" name=""/>
-        <p:cNvGrpSpPr/>
-        <p:nvPr/>
-      </p:nvGrpSpPr>
-      <p:grpSpPr>
-        <a:xfrm>
-          <a:off x="0" y="0"/>
-          <a:ext cx="0" cy="0"/>
-          <a:chOff x="0" y="0"/>
-          <a:chExt cx="0" cy="0"/>
-        </a:xfrm>
-      </p:grpSpPr>
-      <p:sp>
-        <p:nvSpPr>
-          <p:cNvPr id="3" name="Title 2"/>
-          <p:cNvSpPr>
-            <a:spLocks noGrp="1"/>
-          </p:cNvSpPr>
-          <p:nvPr>
-            <p:ph type="title"/>
-          </p:nvPr>
-        </p:nvSpPr>
-        <p:spPr>
-          <a:xfrm>
-            <a:off x="521206" y="448056"/>
-            <a:ext cx="11549867" cy="640080"/>
-          </a:xfrm>
-        </p:spPr>
-        <p:txBody>
-          <a:bodyPr>
-            <a:noAutofit/>
-          </a:bodyPr>
-          <a:lstStyle/>
-          <a:p>
-            <a:r>
-              <a:rPr lang="en-US" sz="2000" b="1" dirty="0">
-                <a:latin typeface="Segoe UI" panose="020B0502040204020203" pitchFamily="34" charset="0"/>
-                <a:cs typeface="Segoe UI" panose="020B0502040204020203" pitchFamily="34" charset="0"/>
-              </a:rPr>
-              <a:t>Initial MLR model did not satisfy linear regression assumptions even after transforming Y and X, but the alternate Logistic Regression model has better predictability</a:t>
-            </a:r>
-          </a:p>
-        </p:txBody>
-      </p:sp>
-      <p:sp>
-        <p:nvSpPr>
-          <p:cNvPr id="2" name="TextBox 1">
-            <a:extLst>
-              <a:ext uri="{FF2B5EF4-FFF2-40B4-BE49-F238E27FC236}">
-                <a16:creationId xmlns:a16="http://schemas.microsoft.com/office/drawing/2014/main" id="{5DE8DC70-E1B9-4B18-90C0-A09468FFADEE}"/>
-              </a:ext>
-            </a:extLst>
-          </p:cNvPr>
-          <p:cNvSpPr txBox="1"/>
-          <p:nvPr/>
-        </p:nvSpPr>
-        <p:spPr>
-          <a:xfrm>
-            <a:off x="730525" y="1318206"/>
-            <a:ext cx="10873409" cy="3693319"/>
-          </a:xfrm>
-          <a:prstGeom prst="rect">
-            <a:avLst/>
-          </a:prstGeom>
-          <a:noFill/>
-        </p:spPr>
-        <p:txBody>
-          <a:bodyPr wrap="square" rtlCol="0">
-            <a:spAutoFit/>
-          </a:bodyPr>
-          <a:lstStyle/>
-          <a:p>
-            <a:pPr marL="285750" indent="-285750">
-              <a:buFont typeface="Arial" panose="020B0604020202020204" pitchFamily="34" charset="0"/>
-              <a:buChar char="•"/>
-            </a:pPr>
-            <a:r>
-              <a:rPr lang="en-US" dirty="0">
-                <a:solidFill>
-                  <a:schemeClr val="tx1">
-                    <a:lumMod val="65000"/>
-                    <a:lumOff val="35000"/>
-                  </a:schemeClr>
-                </a:solidFill>
-              </a:rPr>
-              <a:t>Even after applying transformations, the model fit is still not satisfying linear regression assumptions.</a:t>
-            </a:r>
-          </a:p>
-          <a:p>
-            <a:pPr marL="285750" indent="-285750">
-              <a:buFont typeface="Arial" panose="020B0604020202020204" pitchFamily="34" charset="0"/>
-              <a:buChar char="•"/>
-            </a:pPr>
-            <a:endParaRPr lang="en-US" dirty="0">
-              <a:solidFill>
-                <a:schemeClr val="tx1">
-                  <a:lumMod val="65000"/>
-                  <a:lumOff val="35000"/>
-                </a:schemeClr>
-              </a:solidFill>
-            </a:endParaRPr>
-          </a:p>
-          <a:p>
-            <a:pPr marL="285750" indent="-285750">
-              <a:buFont typeface="Arial" panose="020B0604020202020204" pitchFamily="34" charset="0"/>
-              <a:buChar char="•"/>
-            </a:pPr>
-            <a:r>
-              <a:rPr lang="en-US" dirty="0">
-                <a:solidFill>
-                  <a:schemeClr val="tx1">
-                    <a:lumMod val="65000"/>
-                    <a:lumOff val="35000"/>
-                  </a:schemeClr>
-                </a:solidFill>
-              </a:rPr>
-              <a:t>We still see non-linearity, and non-constant variance issues are still not addressed in the model.</a:t>
-            </a:r>
-          </a:p>
-          <a:p>
-            <a:pPr marL="285750" indent="-285750">
-              <a:buFont typeface="Arial" panose="020B0604020202020204" pitchFamily="34" charset="0"/>
-              <a:buChar char="•"/>
-            </a:pPr>
-            <a:endParaRPr lang="en-US" dirty="0">
-              <a:solidFill>
-                <a:schemeClr val="tx1">
-                  <a:lumMod val="65000"/>
-                  <a:lumOff val="35000"/>
-                </a:schemeClr>
-              </a:solidFill>
-            </a:endParaRPr>
-          </a:p>
-          <a:p>
-            <a:pPr marL="285750" indent="-285750">
-              <a:buFont typeface="Arial" panose="020B0604020202020204" pitchFamily="34" charset="0"/>
-              <a:buChar char="•"/>
-            </a:pPr>
-            <a:r>
-              <a:rPr lang="en-US" dirty="0">
-                <a:solidFill>
-                  <a:schemeClr val="tx1">
-                    <a:lumMod val="65000"/>
-                    <a:lumOff val="35000"/>
-                  </a:schemeClr>
-                </a:solidFill>
-              </a:rPr>
-              <a:t>It could be due to skewed data or outliers in the dataset.</a:t>
-            </a:r>
-          </a:p>
-          <a:p>
-            <a:pPr marL="285750" indent="-285750">
-              <a:buFont typeface="Arial" panose="020B0604020202020204" pitchFamily="34" charset="0"/>
-              <a:buChar char="•"/>
-            </a:pPr>
-            <a:endParaRPr lang="en-US" dirty="0">
-              <a:solidFill>
-                <a:schemeClr val="tx1">
-                  <a:lumMod val="65000"/>
-                  <a:lumOff val="35000"/>
-                </a:schemeClr>
-              </a:solidFill>
-            </a:endParaRPr>
-          </a:p>
-          <a:p>
-            <a:pPr marL="285750" indent="-285750">
-              <a:buFont typeface="Arial" panose="020B0604020202020204" pitchFamily="34" charset="0"/>
-              <a:buChar char="•"/>
-            </a:pPr>
-            <a:r>
-              <a:rPr lang="en-US" dirty="0">
-                <a:solidFill>
-                  <a:schemeClr val="tx1">
-                    <a:lumMod val="65000"/>
-                    <a:lumOff val="35000"/>
-                  </a:schemeClr>
-                </a:solidFill>
-              </a:rPr>
-              <a:t>So we conclude that our initial transformed model is useful for exploring the relationship between predictor and response variables. However, the predicted values will be unreliable.</a:t>
-            </a:r>
-          </a:p>
-          <a:p>
-            <a:pPr marL="285750" indent="-285750">
-              <a:buFont typeface="Arial" panose="020B0604020202020204" pitchFamily="34" charset="0"/>
-              <a:buChar char="•"/>
-            </a:pPr>
-            <a:endParaRPr lang="en-US" dirty="0">
-              <a:solidFill>
-                <a:schemeClr val="tx1">
-                  <a:lumMod val="65000"/>
-                  <a:lumOff val="35000"/>
-                </a:schemeClr>
-              </a:solidFill>
-            </a:endParaRPr>
-          </a:p>
-          <a:p>
-            <a:pPr marL="285750" indent="-285750">
-              <a:buFont typeface="Arial" panose="020B0604020202020204" pitchFamily="34" charset="0"/>
-              <a:buChar char="•"/>
-            </a:pPr>
-            <a:r>
-              <a:rPr lang="en-US" b="1" dirty="0">
-                <a:solidFill>
-                  <a:schemeClr val="tx1">
-                    <a:lumMod val="65000"/>
-                    <a:lumOff val="35000"/>
-                  </a:schemeClr>
-                </a:solidFill>
-              </a:rPr>
-              <a:t>The alternate logistic regression model has the better predictability</a:t>
-            </a:r>
-          </a:p>
-          <a:p>
-            <a:pPr marL="285750" indent="-285750">
-              <a:buFont typeface="Arial" panose="020B0604020202020204" pitchFamily="34" charset="0"/>
-              <a:buChar char="•"/>
-            </a:pPr>
-            <a:endParaRPr lang="en-US" dirty="0">
-              <a:solidFill>
-                <a:schemeClr val="tx1">
-                  <a:lumMod val="65000"/>
-                  <a:lumOff val="35000"/>
-                </a:schemeClr>
-              </a:solidFill>
-            </a:endParaRPr>
-          </a:p>
-          <a:p>
-            <a:pPr marL="285750" indent="-285750">
-              <a:buFont typeface="Arial" panose="020B0604020202020204" pitchFamily="34" charset="0"/>
-              <a:buChar char="•"/>
-            </a:pPr>
-            <a:endParaRPr lang="en-US" dirty="0">
-              <a:solidFill>
-                <a:schemeClr val="tx1">
-                  <a:lumMod val="65000"/>
-                  <a:lumOff val="35000"/>
-                </a:schemeClr>
-              </a:solidFill>
-            </a:endParaRPr>
-          </a:p>
-          <a:p>
-            <a:pPr marL="285750" indent="-285750">
-              <a:buFont typeface="Arial" panose="020B0604020202020204" pitchFamily="34" charset="0"/>
-              <a:buChar char="•"/>
-            </a:pPr>
-            <a:r>
-              <a:rPr lang="en-US" dirty="0">
-                <a:solidFill>
-                  <a:schemeClr val="tx1">
-                    <a:lumMod val="65000"/>
-                    <a:lumOff val="35000"/>
-                  </a:schemeClr>
-                </a:solidFill>
-              </a:rPr>
-              <a:t>Our </a:t>
-            </a:r>
-            <a:r>
-              <a:rPr lang="en-US" b="1" dirty="0">
-                <a:solidFill>
-                  <a:schemeClr val="tx1">
-                    <a:lumMod val="65000"/>
-                    <a:lumOff val="35000"/>
-                  </a:schemeClr>
-                </a:solidFill>
-              </a:rPr>
-              <a:t>team</a:t>
-            </a:r>
-            <a:r>
-              <a:rPr lang="en-US" dirty="0">
-                <a:solidFill>
-                  <a:schemeClr val="tx1">
-                    <a:lumMod val="65000"/>
-                    <a:lumOff val="35000"/>
-                  </a:schemeClr>
-                </a:solidFill>
-              </a:rPr>
-              <a:t> </a:t>
-            </a:r>
-            <a:r>
-              <a:rPr lang="en-US" b="1" dirty="0">
-                <a:solidFill>
-                  <a:schemeClr val="tx1">
-                    <a:lumMod val="65000"/>
-                    <a:lumOff val="35000"/>
-                  </a:schemeClr>
-                </a:solidFill>
-              </a:rPr>
-              <a:t>recommendation</a:t>
-            </a:r>
-            <a:r>
-              <a:rPr lang="en-US" dirty="0">
-                <a:solidFill>
-                  <a:schemeClr val="tx1">
-                    <a:lumMod val="65000"/>
-                    <a:lumOff val="35000"/>
-                  </a:schemeClr>
-                </a:solidFill>
-              </a:rPr>
-              <a:t>:</a:t>
-            </a:r>
-          </a:p>
-        </p:txBody>
-      </p:sp>
-      <p:sp>
-        <p:nvSpPr>
-          <p:cNvPr id="6" name="TextBox 5">
-            <a:extLst>
-              <a:ext uri="{FF2B5EF4-FFF2-40B4-BE49-F238E27FC236}">
-                <a16:creationId xmlns:a16="http://schemas.microsoft.com/office/drawing/2014/main" id="{3AA9870E-86E7-455A-BEED-F66B5FB4C416}"/>
-              </a:ext>
-            </a:extLst>
-          </p:cNvPr>
-          <p:cNvSpPr txBox="1"/>
-          <p:nvPr/>
-        </p:nvSpPr>
-        <p:spPr>
-          <a:xfrm>
-            <a:off x="1467465" y="5010762"/>
-            <a:ext cx="9785554" cy="461665"/>
-          </a:xfrm>
-          <a:prstGeom prst="rect">
-            <a:avLst/>
-          </a:prstGeom>
-          <a:solidFill>
-            <a:srgbClr val="D24726"/>
-          </a:solidFill>
-        </p:spPr>
-        <p:txBody>
-          <a:bodyPr wrap="square" rtlCol="0">
-            <a:spAutoFit/>
-          </a:bodyPr>
-          <a:lstStyle/>
-          <a:p>
-            <a:pPr algn="ctr"/>
-            <a:r>
-              <a:rPr lang="en-US" sz="2400" b="1" dirty="0">
-                <a:solidFill>
-                  <a:schemeClr val="bg1"/>
-                </a:solidFill>
-              </a:rPr>
-              <a:t>The logistic regression model has better predictability.</a:t>
-            </a:r>
-          </a:p>
-        </p:txBody>
-      </p:sp>
-    </p:spTree>
-    <p:extLst>
-      <p:ext uri="{BB962C8B-B14F-4D97-AF65-F5344CB8AC3E}">
-        <p14:creationId xmlns:p14="http://schemas.microsoft.com/office/powerpoint/2010/main" val="3785876348"/>
-      </p:ext>
-    </p:extLst>
-  </p:cSld>
-  <p:clrMapOvr>
-    <a:masterClrMapping/>
-  </p:clrMapOvr>
-  <mc:AlternateContent xmlns:mc="http://schemas.openxmlformats.org/markup-compatibility/2006" xmlns:p14="http://schemas.microsoft.com/office/powerpoint/2010/main">
-    <mc:Choice Requires="p14">
-      <p:transition p14:dur="10"/>
-    </mc:Choice>
-    <mc:Fallback xmlns="">
-      <p:transition/>
-    </mc:Fallback>
-  </mc:AlternateContent>
-</p:sld>
-</file>
-
 <file path=ppt/slides/slide13.xml><?xml version="1.0" encoding="utf-8"?>
 <p:sld xmlns:a="http://schemas.openxmlformats.org/drawingml/2006/main" xmlns:r="http://schemas.openxmlformats.org/officeDocument/2006/relationships" xmlns:p="http://schemas.openxmlformats.org/presentationml/2006/main">
   <p:cSld>
@@ -4327,7 +4551,266 @@
                 <a:latin typeface="Segoe UI" panose="020B0502040204020203" pitchFamily="34" charset="0"/>
                 <a:cs typeface="Segoe UI" panose="020B0502040204020203" pitchFamily="34" charset="0"/>
               </a:rPr>
-              <a:t>Project Conclusion</a:t>
+              <a:t>Initial MLR model did not satisfy linear regression assumptions even after transforming Y and X, but the alternate Logistic Regression model has better predictability</a:t>
+            </a:r>
+          </a:p>
+        </p:txBody>
+      </p:sp>
+      <p:sp>
+        <p:nvSpPr>
+          <p:cNvPr id="2" name="TextBox 1">
+            <a:extLst>
+              <a:ext uri="{FF2B5EF4-FFF2-40B4-BE49-F238E27FC236}">
+                <a16:creationId xmlns:a16="http://schemas.microsoft.com/office/drawing/2014/main" id="{5DE8DC70-E1B9-4B18-90C0-A09468FFADEE}"/>
+              </a:ext>
+            </a:extLst>
+          </p:cNvPr>
+          <p:cNvSpPr txBox="1"/>
+          <p:nvPr/>
+        </p:nvSpPr>
+        <p:spPr>
+          <a:xfrm>
+            <a:off x="730525" y="1318206"/>
+            <a:ext cx="10873409" cy="3693319"/>
+          </a:xfrm>
+          <a:prstGeom prst="rect">
+            <a:avLst/>
+          </a:prstGeom>
+          <a:noFill/>
+        </p:spPr>
+        <p:txBody>
+          <a:bodyPr wrap="square" rtlCol="0">
+            <a:spAutoFit/>
+          </a:bodyPr>
+          <a:lstStyle/>
+          <a:p>
+            <a:pPr marL="285750" indent="-285750">
+              <a:buFont typeface="Arial" panose="020B0604020202020204" pitchFamily="34" charset="0"/>
+              <a:buChar char="•"/>
+            </a:pPr>
+            <a:r>
+              <a:rPr lang="en-US" dirty="0">
+                <a:solidFill>
+                  <a:schemeClr val="tx1">
+                    <a:lumMod val="65000"/>
+                    <a:lumOff val="35000"/>
+                  </a:schemeClr>
+                </a:solidFill>
+              </a:rPr>
+              <a:t>Even after applying transformations, the model fit is still not satisfying linear regression assumptions.</a:t>
+            </a:r>
+          </a:p>
+          <a:p>
+            <a:pPr marL="285750" indent="-285750">
+              <a:buFont typeface="Arial" panose="020B0604020202020204" pitchFamily="34" charset="0"/>
+              <a:buChar char="•"/>
+            </a:pPr>
+            <a:endParaRPr lang="en-US" dirty="0">
+              <a:solidFill>
+                <a:schemeClr val="tx1">
+                  <a:lumMod val="65000"/>
+                  <a:lumOff val="35000"/>
+                </a:schemeClr>
+              </a:solidFill>
+            </a:endParaRPr>
+          </a:p>
+          <a:p>
+            <a:pPr marL="285750" indent="-285750">
+              <a:buFont typeface="Arial" panose="020B0604020202020204" pitchFamily="34" charset="0"/>
+              <a:buChar char="•"/>
+            </a:pPr>
+            <a:r>
+              <a:rPr lang="en-US" dirty="0">
+                <a:solidFill>
+                  <a:schemeClr val="tx1">
+                    <a:lumMod val="65000"/>
+                    <a:lumOff val="35000"/>
+                  </a:schemeClr>
+                </a:solidFill>
+              </a:rPr>
+              <a:t>We still see non-linearity, and non-constant variance issues are still not addressed in the model.</a:t>
+            </a:r>
+          </a:p>
+          <a:p>
+            <a:pPr marL="285750" indent="-285750">
+              <a:buFont typeface="Arial" panose="020B0604020202020204" pitchFamily="34" charset="0"/>
+              <a:buChar char="•"/>
+            </a:pPr>
+            <a:endParaRPr lang="en-US" dirty="0">
+              <a:solidFill>
+                <a:schemeClr val="tx1">
+                  <a:lumMod val="65000"/>
+                  <a:lumOff val="35000"/>
+                </a:schemeClr>
+              </a:solidFill>
+            </a:endParaRPr>
+          </a:p>
+          <a:p>
+            <a:pPr marL="285750" indent="-285750">
+              <a:buFont typeface="Arial" panose="020B0604020202020204" pitchFamily="34" charset="0"/>
+              <a:buChar char="•"/>
+            </a:pPr>
+            <a:r>
+              <a:rPr lang="en-US" dirty="0">
+                <a:solidFill>
+                  <a:schemeClr val="tx1">
+                    <a:lumMod val="65000"/>
+                    <a:lumOff val="35000"/>
+                  </a:schemeClr>
+                </a:solidFill>
+              </a:rPr>
+              <a:t>It could be due to skewed data or outliers in the dataset.</a:t>
+            </a:r>
+          </a:p>
+          <a:p>
+            <a:pPr marL="285750" indent="-285750">
+              <a:buFont typeface="Arial" panose="020B0604020202020204" pitchFamily="34" charset="0"/>
+              <a:buChar char="•"/>
+            </a:pPr>
+            <a:endParaRPr lang="en-US" dirty="0">
+              <a:solidFill>
+                <a:schemeClr val="tx1">
+                  <a:lumMod val="65000"/>
+                  <a:lumOff val="35000"/>
+                </a:schemeClr>
+              </a:solidFill>
+            </a:endParaRPr>
+          </a:p>
+          <a:p>
+            <a:pPr marL="285750" indent="-285750">
+              <a:buFont typeface="Arial" panose="020B0604020202020204" pitchFamily="34" charset="0"/>
+              <a:buChar char="•"/>
+            </a:pPr>
+            <a:r>
+              <a:rPr lang="en-US" dirty="0">
+                <a:solidFill>
+                  <a:schemeClr val="tx1">
+                    <a:lumMod val="65000"/>
+                    <a:lumOff val="35000"/>
+                  </a:schemeClr>
+                </a:solidFill>
+              </a:rPr>
+              <a:t>So we conclude that our initial transformed model is useful for exploring the relationship between predictor and response variables. However, the predicted values will be unreliable.</a:t>
+            </a:r>
+          </a:p>
+          <a:p>
+            <a:pPr marL="285750" indent="-285750">
+              <a:buFont typeface="Arial" panose="020B0604020202020204" pitchFamily="34" charset="0"/>
+              <a:buChar char="•"/>
+            </a:pPr>
+            <a:endParaRPr lang="en-US" dirty="0">
+              <a:solidFill>
+                <a:schemeClr val="tx1">
+                  <a:lumMod val="65000"/>
+                  <a:lumOff val="35000"/>
+                </a:schemeClr>
+              </a:solidFill>
+            </a:endParaRPr>
+          </a:p>
+          <a:p>
+            <a:pPr marL="285750" indent="-285750">
+              <a:buFont typeface="Arial" panose="020B0604020202020204" pitchFamily="34" charset="0"/>
+              <a:buChar char="•"/>
+            </a:pPr>
+            <a:r>
+              <a:rPr lang="en-US" b="1" dirty="0">
+                <a:solidFill>
+                  <a:schemeClr val="tx1">
+                    <a:lumMod val="65000"/>
+                    <a:lumOff val="35000"/>
+                  </a:schemeClr>
+                </a:solidFill>
+              </a:rPr>
+              <a:t>The alternate logistic regression model has the better predictability</a:t>
+            </a:r>
+          </a:p>
+          <a:p>
+            <a:pPr marL="285750" indent="-285750">
+              <a:buFont typeface="Arial" panose="020B0604020202020204" pitchFamily="34" charset="0"/>
+              <a:buChar char="•"/>
+            </a:pPr>
+            <a:endParaRPr lang="en-US" dirty="0">
+              <a:solidFill>
+                <a:schemeClr val="tx1">
+                  <a:lumMod val="65000"/>
+                  <a:lumOff val="35000"/>
+                </a:schemeClr>
+              </a:solidFill>
+            </a:endParaRPr>
+          </a:p>
+          <a:p>
+            <a:pPr marL="285750" indent="-285750">
+              <a:buFont typeface="Arial" panose="020B0604020202020204" pitchFamily="34" charset="0"/>
+              <a:buChar char="•"/>
+            </a:pPr>
+            <a:endParaRPr lang="en-US" dirty="0">
+              <a:solidFill>
+                <a:schemeClr val="tx1">
+                  <a:lumMod val="65000"/>
+                  <a:lumOff val="35000"/>
+                </a:schemeClr>
+              </a:solidFill>
+            </a:endParaRPr>
+          </a:p>
+          <a:p>
+            <a:pPr marL="285750" indent="-285750">
+              <a:buFont typeface="Arial" panose="020B0604020202020204" pitchFamily="34" charset="0"/>
+              <a:buChar char="•"/>
+            </a:pPr>
+            <a:r>
+              <a:rPr lang="en-US" dirty="0">
+                <a:solidFill>
+                  <a:schemeClr val="tx1">
+                    <a:lumMod val="65000"/>
+                    <a:lumOff val="35000"/>
+                  </a:schemeClr>
+                </a:solidFill>
+              </a:rPr>
+              <a:t>Our </a:t>
+            </a:r>
+            <a:r>
+              <a:rPr lang="en-US" b="1" dirty="0">
+                <a:solidFill>
+                  <a:schemeClr val="tx1">
+                    <a:lumMod val="65000"/>
+                    <a:lumOff val="35000"/>
+                  </a:schemeClr>
+                </a:solidFill>
+              </a:rPr>
+              <a:t>team</a:t>
+            </a:r>
+            <a:r>
+              <a:rPr lang="en-US" dirty="0">
+                <a:solidFill>
+                  <a:schemeClr val="tx1">
+                    <a:lumMod val="65000"/>
+                    <a:lumOff val="35000"/>
+                  </a:schemeClr>
+                </a:solidFill>
+              </a:rPr>
+              <a:t> </a:t>
+            </a:r>
+            <a:r>
+              <a:rPr lang="en-US" b="1" dirty="0">
+                <a:solidFill>
+                  <a:schemeClr val="tx1">
+                    <a:lumMod val="65000"/>
+                    <a:lumOff val="35000"/>
+                  </a:schemeClr>
+                </a:solidFill>
+              </a:rPr>
+              <a:t>recommendation</a:t>
+            </a:r>
+            <a:r>
+              <a:rPr lang="en-US" dirty="0">
+                <a:solidFill>
+                  <a:schemeClr val="tx1">
+                    <a:lumMod val="65000"/>
+                    <a:lumOff val="35000"/>
+                  </a:schemeClr>
+                </a:solidFill>
+              </a:rPr>
+              <a:t>:</a:t>
             </a:r>
           </a:p>
         </p:txBody>
@@ -4346,7 +4829,119 @@
         </p:nvSpPr>
         <p:spPr>
           <a:xfrm>
-            <a:off x="1523325" y="2038429"/>
+            <a:off x="1467465" y="5010762"/>
+            <a:ext cx="9785554" cy="461665"/>
+          </a:xfrm>
+          <a:prstGeom prst="rect">
+            <a:avLst/>
+          </a:prstGeom>
+          <a:solidFill>
+            <a:srgbClr val="D24726"/>
+          </a:solidFill>
+        </p:spPr>
+        <p:txBody>
+          <a:bodyPr wrap="square" rtlCol="0">
+            <a:spAutoFit/>
+          </a:bodyPr>
+          <a:lstStyle/>
+          <a:p>
+            <a:pPr algn="ctr"/>
+            <a:r>
+              <a:rPr lang="en-US" sz="2400" b="1" dirty="0">
+                <a:solidFill>
+                  <a:schemeClr val="bg1"/>
+                </a:solidFill>
+              </a:rPr>
+              <a:t>The logistic regression model has better predictability.</a:t>
+            </a:r>
+          </a:p>
+        </p:txBody>
+      </p:sp>
+    </p:spTree>
+    <p:extLst>
+      <p:ext uri="{BB962C8B-B14F-4D97-AF65-F5344CB8AC3E}">
+        <p14:creationId xmlns:p14="http://schemas.microsoft.com/office/powerpoint/2010/main" val="3785876348"/>
+      </p:ext>
+    </p:extLst>
+  </p:cSld>
+  <p:clrMapOvr>
+    <a:masterClrMapping/>
+  </p:clrMapOvr>
+  <mc:AlternateContent xmlns:mc="http://schemas.openxmlformats.org/markup-compatibility/2006" xmlns:p14="http://schemas.microsoft.com/office/powerpoint/2010/main">
+    <mc:Choice Requires="p14">
+      <p:transition p14:dur="10"/>
+    </mc:Choice>
+    <mc:Fallback xmlns="">
+      <p:transition/>
+    </mc:Fallback>
+  </mc:AlternateContent>
+</p:sld>
+</file>
+
+<file path=ppt/slides/slide14.xml><?xml version="1.0" encoding="utf-8"?>
+<p:sld xmlns:a="http://schemas.openxmlformats.org/drawingml/2006/main" xmlns:r="http://schemas.openxmlformats.org/officeDocument/2006/relationships" xmlns:p="http://schemas.openxmlformats.org/presentationml/2006/main">
+  <p:cSld>
+    <p:spTree>
+      <p:nvGrpSpPr>
+        <p:cNvPr id="1" name=""/>
+        <p:cNvGrpSpPr/>
+        <p:nvPr/>
+      </p:nvGrpSpPr>
+      <p:grpSpPr>
+        <a:xfrm>
+          <a:off x="0" y="0"/>
+          <a:ext cx="0" cy="0"/>
+          <a:chOff x="0" y="0"/>
+          <a:chExt cx="0" cy="0"/>
+        </a:xfrm>
+      </p:grpSpPr>
+      <p:sp>
+        <p:nvSpPr>
+          <p:cNvPr id="3" name="Title 2"/>
+          <p:cNvSpPr>
+            <a:spLocks noGrp="1"/>
+          </p:cNvSpPr>
+          <p:nvPr>
+            <p:ph type="title"/>
+          </p:nvPr>
+        </p:nvSpPr>
+        <p:spPr>
+          <a:xfrm>
+            <a:off x="521206" y="448056"/>
+            <a:ext cx="11549867" cy="640080"/>
+          </a:xfrm>
+        </p:spPr>
+        <p:txBody>
+          <a:bodyPr>
+            <a:noAutofit/>
+          </a:bodyPr>
+          <a:lstStyle/>
+          <a:p>
+            <a:r>
+              <a:rPr lang="en-US" sz="2000" b="1" dirty="0">
+                <a:latin typeface="Segoe UI" panose="020B0502040204020203" pitchFamily="34" charset="0"/>
+                <a:cs typeface="Segoe UI" panose="020B0502040204020203" pitchFamily="34" charset="0"/>
+              </a:rPr>
+              <a:t>Project Conclusion</a:t>
+            </a:r>
+          </a:p>
+        </p:txBody>
+      </p:sp>
+      <p:sp>
+        <p:nvSpPr>
+          <p:cNvPr id="6" name="TextBox 5">
+            <a:extLst>
+              <a:ext uri="{FF2B5EF4-FFF2-40B4-BE49-F238E27FC236}">
+                <a16:creationId xmlns:a16="http://schemas.microsoft.com/office/drawing/2014/main" id="{3AA9870E-86E7-455A-BEED-F66B5FB4C416}"/>
+              </a:ext>
+            </a:extLst>
+          </p:cNvPr>
+          <p:cNvSpPr txBox="1"/>
+          <p:nvPr/>
+        </p:nvSpPr>
+        <p:spPr>
+          <a:xfrm>
+            <a:off x="1530640" y="2038429"/>
             <a:ext cx="9019450" cy="400110"/>
           </a:xfrm>
           <a:prstGeom prst="rect">
@@ -4388,7 +4983,7 @@
         </p:nvSpPr>
         <p:spPr>
           <a:xfrm>
-            <a:off x="740464" y="2716625"/>
+            <a:off x="603660" y="3645656"/>
             <a:ext cx="10873409" cy="1200329"/>
           </a:xfrm>
           <a:prstGeom prst="rect">
@@ -4447,6 +5042,36 @@
           </a:p>
         </p:txBody>
       </p:sp>
+      <p:pic>
+        <p:nvPicPr>
+          <p:cNvPr id="2" name="Picture 1">
+            <a:extLst>
+              <a:ext uri="{FF2B5EF4-FFF2-40B4-BE49-F238E27FC236}">
+                <a16:creationId xmlns:a16="http://schemas.microsoft.com/office/drawing/2014/main" id="{BA35E7F0-52C5-4CC0-B115-1D9AF3CCC53C}"/>
+              </a:ext>
+            </a:extLst>
+          </p:cNvPr>
+          <p:cNvPicPr>
+            <a:picLocks noChangeAspect="1"/>
+          </p:cNvPicPr>
+          <p:nvPr/>
+        </p:nvPicPr>
+        <p:blipFill>
+          <a:blip r:embed="rId2"/>
+          <a:stretch>
+            <a:fillRect/>
+          </a:stretch>
+        </p:blipFill>
+        <p:spPr>
+          <a:xfrm>
+            <a:off x="2798368" y="2671650"/>
+            <a:ext cx="6595264" cy="757350"/>
+          </a:xfrm>
+          <a:prstGeom prst="rect">
+            <a:avLst/>
+          </a:prstGeom>
+        </p:spPr>
+      </p:pic>
     </p:spTree>
     <p:extLst>
       <p:ext uri="{BB962C8B-B14F-4D97-AF65-F5344CB8AC3E}">
@@ -4507,21 +5132,7 @@
                 <a:latin typeface="+mn-lt"/>
                 <a:cs typeface="Segoe UI Light" panose="020B0502040204020203" pitchFamily="34" charset="0"/>
               </a:rPr>
-              <a:t>The</a:t>
-            </a:r>
-            <a:r>
-              <a:rPr lang="en-US" b="1" dirty="0">
-                <a:latin typeface="Segoe UI Light" panose="020B0502040204020203" pitchFamily="34" charset="0"/>
-                <a:cs typeface="Segoe UI Light" panose="020B0502040204020203" pitchFamily="34" charset="0"/>
-              </a:rPr>
-              <a:t> </a:t>
-            </a:r>
-            <a:r>
-              <a:rPr lang="en-US" b="1" dirty="0">
-                <a:latin typeface="+mn-lt"/>
-                <a:cs typeface="Segoe UI Light" panose="020B0502040204020203" pitchFamily="34" charset="0"/>
-              </a:rPr>
-              <a:t>Context</a:t>
+              <a:t>The Context</a:t>
             </a:r>
           </a:p>
         </p:txBody>
@@ -6203,6 +6814,363 @@
       </p:grpSpPr>
       <p:sp>
         <p:nvSpPr>
+          <p:cNvPr id="8" name="Title 7"/>
+          <p:cNvSpPr>
+            <a:spLocks noGrp="1"/>
+          </p:cNvSpPr>
+          <p:nvPr>
+            <p:ph type="title"/>
+          </p:nvPr>
+        </p:nvSpPr>
+        <p:spPr/>
+        <p:txBody>
+          <a:bodyPr>
+            <a:noAutofit/>
+          </a:bodyPr>
+          <a:lstStyle/>
+          <a:p>
+            <a:r>
+              <a:rPr lang="en-US" b="1" dirty="0">
+                <a:latin typeface="+mn-lt"/>
+                <a:cs typeface="Segoe UI Light" panose="020B0502040204020203" pitchFamily="34" charset="0"/>
+              </a:rPr>
+              <a:t>The</a:t>
+            </a:r>
+            <a:r>
+              <a:rPr lang="en-US" b="1" dirty="0">
+                <a:latin typeface="Segoe UI Light" panose="020B0502040204020203" pitchFamily="34" charset="0"/>
+                <a:cs typeface="Segoe UI Light" panose="020B0502040204020203" pitchFamily="34" charset="0"/>
+              </a:rPr>
+              <a:t> </a:t>
+            </a:r>
+            <a:r>
+              <a:rPr lang="en-US" b="1" dirty="0">
+                <a:latin typeface="+mn-lt"/>
+                <a:cs typeface="Segoe UI Light" panose="020B0502040204020203" pitchFamily="34" charset="0"/>
+              </a:rPr>
+              <a:t>Executive Summary</a:t>
+            </a:r>
+          </a:p>
+        </p:txBody>
+      </p:sp>
+      <p:sp>
+        <p:nvSpPr>
+          <p:cNvPr id="6" name="TextBox 5">
+            <a:extLst>
+              <a:ext uri="{FF2B5EF4-FFF2-40B4-BE49-F238E27FC236}">
+                <a16:creationId xmlns:a16="http://schemas.microsoft.com/office/drawing/2014/main" id="{7C03403D-829C-4667-8B21-556BD3F3FB7E}"/>
+              </a:ext>
+            </a:extLst>
+          </p:cNvPr>
+          <p:cNvSpPr txBox="1"/>
+          <p:nvPr/>
+        </p:nvSpPr>
+        <p:spPr>
+          <a:xfrm>
+            <a:off x="869091" y="1628675"/>
+            <a:ext cx="10251989" cy="3693319"/>
+          </a:xfrm>
+          <a:prstGeom prst="rect">
+            <a:avLst/>
+          </a:prstGeom>
+          <a:noFill/>
+        </p:spPr>
+        <p:txBody>
+          <a:bodyPr wrap="square">
+            <a:spAutoFit/>
+          </a:bodyPr>
+          <a:lstStyle/>
+          <a:p>
+            <a:pPr marL="285750" indent="-285750" algn="l">
+              <a:buFont typeface="Arial" panose="020B0604020202020204" pitchFamily="34" charset="0"/>
+              <a:buChar char="•"/>
+            </a:pPr>
+            <a:r>
+              <a:rPr lang="en-US" b="1" i="0" dirty="0">
+                <a:solidFill>
+                  <a:srgbClr val="D24726"/>
+                </a:solidFill>
+                <a:effectLst/>
+              </a:rPr>
+              <a:t>Goal</a:t>
+            </a:r>
+            <a:r>
+              <a:rPr lang="en-US" dirty="0">
+                <a:solidFill>
+                  <a:schemeClr val="tx1">
+                    <a:lumMod val="65000"/>
+                    <a:lumOff val="35000"/>
+                  </a:schemeClr>
+                </a:solidFill>
+              </a:rPr>
+              <a:t> :</a:t>
+            </a:r>
+            <a:r>
+              <a:rPr lang="en-US" b="0" i="0" dirty="0">
+                <a:solidFill>
+                  <a:schemeClr val="tx1">
+                    <a:lumMod val="65000"/>
+                    <a:lumOff val="35000"/>
+                  </a:schemeClr>
+                </a:solidFill>
+                <a:effectLst/>
+              </a:rPr>
+              <a:t> To build a model that can predict an American’s expected medical costs based on demographic information.</a:t>
+            </a:r>
+          </a:p>
+          <a:p>
+            <a:pPr algn="l"/>
+            <a:endParaRPr lang="en-US" b="0" i="0" dirty="0">
+              <a:solidFill>
+                <a:schemeClr val="tx1">
+                  <a:lumMod val="65000"/>
+                  <a:lumOff val="35000"/>
+                </a:schemeClr>
+              </a:solidFill>
+              <a:effectLst/>
+            </a:endParaRPr>
+          </a:p>
+          <a:p>
+            <a:pPr algn="l"/>
+            <a:endParaRPr lang="en-US" b="0" i="0" dirty="0">
+              <a:solidFill>
+                <a:schemeClr val="tx1">
+                  <a:lumMod val="65000"/>
+                  <a:lumOff val="35000"/>
+                </a:schemeClr>
+              </a:solidFill>
+              <a:effectLst/>
+            </a:endParaRPr>
+          </a:p>
+          <a:p>
+            <a:pPr marL="285750" indent="-285750" algn="l">
+              <a:buFont typeface="Arial" panose="020B0604020202020204" pitchFamily="34" charset="0"/>
+              <a:buChar char="•"/>
+            </a:pPr>
+            <a:r>
+              <a:rPr lang="en-US" b="1" i="0" dirty="0">
+                <a:solidFill>
+                  <a:srgbClr val="D24726"/>
+                </a:solidFill>
+                <a:effectLst/>
+              </a:rPr>
+              <a:t>Results </a:t>
+            </a:r>
+            <a:r>
+              <a:rPr lang="en-US" i="0" dirty="0">
+                <a:solidFill>
+                  <a:schemeClr val="tx1">
+                    <a:lumMod val="65000"/>
+                    <a:lumOff val="35000"/>
+                  </a:schemeClr>
+                </a:solidFill>
+                <a:effectLst/>
+              </a:rPr>
+              <a:t>:</a:t>
+            </a:r>
+            <a:r>
+              <a:rPr lang="en-US" b="0" i="0" dirty="0">
+                <a:solidFill>
+                  <a:schemeClr val="tx1">
+                    <a:lumMod val="65000"/>
+                    <a:lumOff val="35000"/>
+                  </a:schemeClr>
+                </a:solidFill>
+                <a:effectLst/>
+              </a:rPr>
+              <a:t> We can predict whether an individual’s medical costs are above or below $20,000.</a:t>
+            </a:r>
+          </a:p>
+          <a:p>
+            <a:pPr algn="l"/>
+            <a:endParaRPr lang="en-US" b="0" i="0" dirty="0">
+              <a:solidFill>
+                <a:schemeClr val="tx1">
+                  <a:lumMod val="65000"/>
+                  <a:lumOff val="35000"/>
+                </a:schemeClr>
+              </a:solidFill>
+              <a:effectLst/>
+            </a:endParaRPr>
+          </a:p>
+          <a:p>
+            <a:pPr algn="l"/>
+            <a:endParaRPr lang="en-US" b="0" i="0" dirty="0">
+              <a:solidFill>
+                <a:schemeClr val="tx1">
+                  <a:lumMod val="65000"/>
+                  <a:lumOff val="35000"/>
+                </a:schemeClr>
+              </a:solidFill>
+              <a:effectLst/>
+            </a:endParaRPr>
+          </a:p>
+          <a:p>
+            <a:pPr marL="285750" indent="-285750" algn="l">
+              <a:buFont typeface="Arial" panose="020B0604020202020204" pitchFamily="34" charset="0"/>
+              <a:buChar char="•"/>
+            </a:pPr>
+            <a:r>
+              <a:rPr lang="en-US" b="1" i="0" dirty="0">
+                <a:solidFill>
+                  <a:srgbClr val="D24726"/>
+                </a:solidFill>
+                <a:effectLst/>
+              </a:rPr>
+              <a:t>Data</a:t>
+            </a:r>
+            <a:r>
+              <a:rPr lang="en-US" dirty="0">
+                <a:solidFill>
+                  <a:schemeClr val="tx1">
+                    <a:lumMod val="65000"/>
+                    <a:lumOff val="35000"/>
+                  </a:schemeClr>
+                </a:solidFill>
+              </a:rPr>
+              <a:t> :</a:t>
+            </a:r>
+            <a:r>
+              <a:rPr lang="en-US" b="0" i="0" dirty="0">
+                <a:solidFill>
+                  <a:schemeClr val="tx1">
+                    <a:lumMod val="65000"/>
+                    <a:lumOff val="35000"/>
+                  </a:schemeClr>
+                </a:solidFill>
+                <a:effectLst/>
+              </a:rPr>
+              <a:t>The data set gives the age, sex, </a:t>
+            </a:r>
+            <a:r>
+              <a:rPr lang="en-US" b="0" i="0" dirty="0" err="1">
+                <a:solidFill>
+                  <a:schemeClr val="tx1">
+                    <a:lumMod val="65000"/>
+                    <a:lumOff val="35000"/>
+                  </a:schemeClr>
+                </a:solidFill>
+                <a:effectLst/>
+              </a:rPr>
+              <a:t>bmi</a:t>
+            </a:r>
+            <a:r>
+              <a:rPr lang="en-US" b="0" i="0" dirty="0">
+                <a:solidFill>
+                  <a:schemeClr val="tx1">
+                    <a:lumMod val="65000"/>
+                    <a:lumOff val="35000"/>
+                  </a:schemeClr>
+                </a:solidFill>
+                <a:effectLst/>
+              </a:rPr>
+              <a:t>, number of children, smoker status, region of residence, and medical charges for 1338 individuals.</a:t>
+            </a:r>
+          </a:p>
+          <a:p>
+            <a:pPr algn="l"/>
+            <a:endParaRPr lang="en-US" b="0" i="0" dirty="0">
+              <a:solidFill>
+                <a:schemeClr val="tx1">
+                  <a:lumMod val="65000"/>
+                  <a:lumOff val="35000"/>
+                </a:schemeClr>
+              </a:solidFill>
+              <a:effectLst/>
+            </a:endParaRPr>
+          </a:p>
+          <a:p>
+            <a:pPr algn="l"/>
+            <a:endParaRPr lang="en-US" b="0" i="0" dirty="0">
+              <a:solidFill>
+                <a:schemeClr val="tx1">
+                  <a:lumMod val="65000"/>
+                  <a:lumOff val="35000"/>
+                </a:schemeClr>
+              </a:solidFill>
+              <a:effectLst/>
+            </a:endParaRPr>
+          </a:p>
+          <a:p>
+            <a:pPr marL="285750" indent="-285750" algn="l">
+              <a:buFont typeface="Arial" panose="020B0604020202020204" pitchFamily="34" charset="0"/>
+              <a:buChar char="•"/>
+            </a:pPr>
+            <a:r>
+              <a:rPr lang="en-US" b="1" i="0" dirty="0">
+                <a:solidFill>
+                  <a:srgbClr val="D24726"/>
+                </a:solidFill>
+                <a:effectLst/>
+              </a:rPr>
+              <a:t>Key finding</a:t>
+            </a:r>
+            <a:r>
+              <a:rPr lang="en-US" dirty="0">
+                <a:solidFill>
+                  <a:schemeClr val="tx1">
+                    <a:lumMod val="65000"/>
+                    <a:lumOff val="35000"/>
+                  </a:schemeClr>
+                </a:solidFill>
+              </a:rPr>
+              <a:t> : </a:t>
+            </a:r>
+            <a:r>
+              <a:rPr lang="en-US" b="0" i="0" dirty="0">
+                <a:solidFill>
+                  <a:schemeClr val="tx1">
+                    <a:lumMod val="65000"/>
+                    <a:lumOff val="35000"/>
+                  </a:schemeClr>
+                </a:solidFill>
+                <a:effectLst/>
+              </a:rPr>
+              <a:t>The odds of one's charges being over $20,000 is multiplied by a factor of 116 for a smoker compared to a non-smoker, while age and BMI are held constant.</a:t>
+            </a:r>
+          </a:p>
+        </p:txBody>
+      </p:sp>
+    </p:spTree>
+    <p:extLst>
+      <p:ext uri="{BB962C8B-B14F-4D97-AF65-F5344CB8AC3E}">
+        <p14:creationId xmlns:p14="http://schemas.microsoft.com/office/powerpoint/2010/main" val="1857431673"/>
+      </p:ext>
+    </p:extLst>
+  </p:cSld>
+  <p:clrMapOvr>
+    <a:masterClrMapping/>
+  </p:clrMapOvr>
+  <mc:AlternateContent xmlns:mc="http://schemas.openxmlformats.org/markup-compatibility/2006" xmlns:p14="http://schemas.microsoft.com/office/powerpoint/2010/main">
+    <mc:Choice Requires="p14">
+      <p:transition p14:dur="10"/>
+    </mc:Choice>
+    <mc:Fallback xmlns="">
+      <p:transition/>
+    </mc:Fallback>
+  </mc:AlternateContent>
+</p:sld>
+</file>
+
+<file path=ppt/slides/slide5.xml><?xml version="1.0" encoding="utf-8"?>
+<p:sld xmlns:a="http://schemas.openxmlformats.org/drawingml/2006/main" xmlns:r="http://schemas.openxmlformats.org/officeDocument/2006/relationships" xmlns:p="http://schemas.openxmlformats.org/presentationml/2006/main">
+  <p:cSld>
+    <p:spTree>
+      <p:nvGrpSpPr>
+        <p:cNvPr id="1" name=""/>
+        <p:cNvGrpSpPr/>
+        <p:nvPr/>
+      </p:nvGrpSpPr>
+      <p:grpSpPr>
+        <a:xfrm>
+          <a:off x="0" y="0"/>
+          <a:ext cx="0" cy="0"/>
+          <a:chOff x="0" y="0"/>
+          <a:chExt cx="0" cy="0"/>
+        </a:xfrm>
+      </p:grpSpPr>
+      <p:sp>
+        <p:nvSpPr>
           <p:cNvPr id="4" name="Title 3"/>
           <p:cNvSpPr>
             <a:spLocks noGrp="1"/>
@@ -7009,7 +7977,7 @@
 </p:sld>
 </file>
 
-<file path=ppt/slides/slide5.xml><?xml version="1.0" encoding="utf-8"?>
+<file path=ppt/slides/slide6.xml><?xml version="1.0" encoding="utf-8"?>
 <p:sld xmlns:a="http://schemas.openxmlformats.org/drawingml/2006/main" xmlns:r="http://schemas.openxmlformats.org/officeDocument/2006/relationships" xmlns:p="http://schemas.openxmlformats.org/presentationml/2006/main">
   <p:cSld>
     <p:spTree>
@@ -7068,7 +8036,7 @@
         <p:spPr>
           <a:xfrm>
             <a:off x="664864" y="1389018"/>
-            <a:ext cx="5333662" cy="5396349"/>
+            <a:ext cx="5333662" cy="5447645"/>
           </a:xfrm>
           <a:prstGeom prst="rect">
             <a:avLst/>
@@ -7086,7 +8054,24 @@
             </a:pPr>
             <a:r>
               <a:rPr lang="en-US" dirty="0"/>
-              <a:t>The dataset has 1338 rows. The </a:t>
+              <a:t>Sample Size: n = 1338</a:t>
+            </a:r>
+          </a:p>
+          <a:p>
+            <a:pPr marL="285750" indent="-285750">
+              <a:buFont typeface="Arial" panose="020B0604020202020204" pitchFamily="34" charset="0"/>
+              <a:buChar char="•"/>
+            </a:pPr>
+            <a:endParaRPr lang="en-US" dirty="0"/>
+          </a:p>
+          <a:p>
+            <a:pPr marL="285750" indent="-285750">
+              <a:buFont typeface="Arial" panose="020B0604020202020204" pitchFamily="34" charset="0"/>
+              <a:buChar char="•"/>
+            </a:pPr>
+            <a:r>
+              <a:rPr lang="en-US" dirty="0"/>
+              <a:t>Response variable: </a:t>
             </a:r>
             <a:r>
               <a:rPr lang="en-US" b="1" dirty="0">
@@ -7098,7 +8083,34 @@
             </a:r>
             <a:r>
               <a:rPr lang="en-US" dirty="0"/>
-              <a:t> field is the response variable, and </a:t>
+              <a:t> </a:t>
+            </a:r>
+          </a:p>
+          <a:p>
+            <a:pPr marL="285750" indent="-285750">
+              <a:buFont typeface="Arial" panose="020B0604020202020204" pitchFamily="34" charset="0"/>
+              <a:buChar char="•"/>
+            </a:pPr>
+            <a:endParaRPr lang="en-US" dirty="0"/>
+          </a:p>
+          <a:p>
+            <a:pPr marL="285750" indent="-285750">
+              <a:buFont typeface="Arial" panose="020B0604020202020204" pitchFamily="34" charset="0"/>
+              <a:buChar char="•"/>
+            </a:pPr>
+            <a:r>
+              <a:rPr lang="en-US" dirty="0"/>
+              <a:t>Predictor variables: </a:t>
+            </a:r>
+          </a:p>
+          <a:p>
+            <a:pPr marL="742950" lvl="1" indent="-285750">
+              <a:buFont typeface="Arial" panose="020B0604020202020204" pitchFamily="34" charset="0"/>
+              <a:buChar char="•"/>
+            </a:pPr>
+            <a:r>
+              <a:rPr lang="en-US" dirty="0"/>
+              <a:t>Categorical: </a:t>
             </a:r>
             <a:r>
               <a:rPr lang="en-US" b="1" dirty="0">
@@ -7134,7 +8146,49 @@
             </a:r>
             <a:r>
               <a:rPr lang="en-US" dirty="0"/>
-              <a:t> are categorical predictors.</a:t>
+              <a:t> </a:t>
+            </a:r>
+          </a:p>
+          <a:p>
+            <a:pPr marL="742950" lvl="1" indent="-285750">
+              <a:buFont typeface="Arial" panose="020B0604020202020204" pitchFamily="34" charset="0"/>
+              <a:buChar char="•"/>
+            </a:pPr>
+            <a:r>
+              <a:rPr lang="en-US" dirty="0"/>
+              <a:t>Quantitative: </a:t>
+            </a:r>
+            <a:r>
+              <a:rPr lang="en-US" b="1" dirty="0">
+                <a:solidFill>
+                  <a:srgbClr val="FF0000"/>
+                </a:solidFill>
+              </a:rPr>
+              <a:t>age</a:t>
+            </a:r>
+            <a:r>
+              <a:rPr lang="en-US" dirty="0"/>
+              <a:t>, </a:t>
+            </a:r>
+            <a:r>
+              <a:rPr lang="en-US" b="1" dirty="0" err="1">
+                <a:solidFill>
+                  <a:srgbClr val="FF0000"/>
+                </a:solidFill>
+              </a:rPr>
+              <a:t>bmi</a:t>
+            </a:r>
+            <a:r>
+              <a:rPr lang="en-US" dirty="0"/>
+              <a:t>, and </a:t>
+            </a:r>
+            <a:r>
+              <a:rPr lang="en-US" b="1" dirty="0">
+                <a:solidFill>
+                  <a:srgbClr val="FF0000"/>
+                </a:solidFill>
+              </a:rPr>
+              <a:t>children</a:t>
             </a:r>
           </a:p>
           <a:p>
@@ -7160,7 +8214,7 @@
             </a:pPr>
             <a:r>
               <a:rPr lang="en-US" dirty="0"/>
-              <a:t>Majority of people have expenses between zero and $15000, with only seeing charges greater than $20000.</a:t>
+              <a:t>Transformation for a more normal distribution</a:t>
             </a:r>
           </a:p>
           <a:p>
@@ -7197,53 +8251,8 @@
                 <a:latin typeface="Segoe UI" panose="020B0502040204020203" pitchFamily="34" charset="0"/>
                 <a:cs typeface="Segoe UI" panose="020B0502040204020203" pitchFamily="34" charset="0"/>
               </a:rPr>
-              <a:t>   summary(</a:t>
-            </a:r>
-            <a:r>
-              <a:rPr lang="en-US" sz="1600" dirty="0" err="1">
-                <a:solidFill>
-                  <a:schemeClr val="tx1">
-                    <a:lumMod val="65000"/>
-                    <a:lumOff val="35000"/>
-                  </a:schemeClr>
-                </a:solidFill>
-                <a:latin typeface="Segoe UI" panose="020B0502040204020203" pitchFamily="34" charset="0"/>
-                <a:cs typeface="Segoe UI" panose="020B0502040204020203" pitchFamily="34" charset="0"/>
-              </a:rPr>
-              <a:t>data$charges</a:t>
-            </a:r>
-            <a:r>
-              <a:rPr lang="en-US" sz="1600" dirty="0">
-                <a:solidFill>
-                  <a:prstClr val="black">
-                    <a:lumMod val="75000"/>
-                    <a:lumOff val="25000"/>
-                  </a:prstClr>
-                </a:solidFill>
-                <a:latin typeface="Segoe UI" panose="020B0502040204020203" pitchFamily="34" charset="0"/>
-                <a:cs typeface="Segoe UI" panose="020B0502040204020203" pitchFamily="34" charset="0"/>
-              </a:rPr>
-              <a:t>)</a:t>
-            </a:r>
-          </a:p>
-          <a:p>
-            <a:pPr marL="285750" indent="-285750">
-              <a:spcAft>
-                <a:spcPts val="2000"/>
-              </a:spcAft>
-              <a:buFont typeface="Arial" panose="020B0604020202020204" pitchFamily="34" charset="0"/>
-              <a:buChar char="•"/>
-            </a:pPr>
-            <a:endParaRPr lang="en-US" sz="1600" dirty="0">
-              <a:solidFill>
-                <a:prstClr val="black">
-                  <a:lumMod val="75000"/>
-                  <a:lumOff val="25000"/>
-                </a:prstClr>
-              </a:solidFill>
-              <a:latin typeface="Segoe UI" panose="020B0502040204020203" pitchFamily="34" charset="0"/>
-              <a:cs typeface="Segoe UI" panose="020B0502040204020203" pitchFamily="34" charset="0"/>
-            </a:endParaRPr>
+              <a:t>   </a:t>
+            </a:r>
           </a:p>
           <a:p>
             <a:pPr>
@@ -7394,7 +8403,7 @@
 </p:sld>
 </file>
 
-<file path=ppt/slides/slide6.xml><?xml version="1.0" encoding="utf-8"?>
+<file path=ppt/slides/slide7.xml><?xml version="1.0" encoding="utf-8"?>
 <p:sld xmlns:a="http://schemas.openxmlformats.org/drawingml/2006/main" xmlns:r="http://schemas.openxmlformats.org/officeDocument/2006/relationships" xmlns:p="http://schemas.openxmlformats.org/presentationml/2006/main">
   <p:cSld>
     <p:spTree>
@@ -7699,7 +8708,7 @@
 </p:sld>
 </file>
 
-<file path=ppt/slides/slide7.xml><?xml version="1.0" encoding="utf-8"?>
+<file path=ppt/slides/slide8.xml><?xml version="1.0" encoding="utf-8"?>
 <p:sld xmlns:a="http://schemas.openxmlformats.org/drawingml/2006/main" xmlns:r="http://schemas.openxmlformats.org/officeDocument/2006/relationships" xmlns:p="http://schemas.openxmlformats.org/presentationml/2006/main">
   <p:cSld>
     <p:spTree>
@@ -7998,7 +9007,7 @@
 </p:sld>
 </file>
 
-<file path=ppt/slides/slide8.xml><?xml version="1.0" encoding="utf-8"?>
+<file path=ppt/slides/slide9.xml><?xml version="1.0" encoding="utf-8"?>
 <p:sld xmlns:a="http://schemas.openxmlformats.org/drawingml/2006/main" xmlns:r="http://schemas.openxmlformats.org/officeDocument/2006/relationships" xmlns:p="http://schemas.openxmlformats.org/presentationml/2006/main">
   <p:cSld>
     <p:spTree>
@@ -8412,608 +9421,6 @@
     <p:extLst>
       <p:ext uri="{BB962C8B-B14F-4D97-AF65-F5344CB8AC3E}">
         <p14:creationId xmlns:p14="http://schemas.microsoft.com/office/powerpoint/2010/main" val="161125803"/>
-      </p:ext>
-    </p:extLst>
-  </p:cSld>
-  <p:clrMapOvr>
-    <a:masterClrMapping/>
-  </p:clrMapOvr>
-  <mc:AlternateContent xmlns:mc="http://schemas.openxmlformats.org/markup-compatibility/2006" xmlns:p14="http://schemas.microsoft.com/office/powerpoint/2010/main">
-    <mc:Choice Requires="p14">
-      <p:transition p14:dur="10"/>
-    </mc:Choice>
-    <mc:Fallback xmlns="">
-      <p:transition/>
-    </mc:Fallback>
-  </mc:AlternateContent>
-</p:sld>
-</file>
-
-<file path=ppt/slides/slide9.xml><?xml version="1.0" encoding="utf-8"?>
-<p:sld xmlns:a="http://schemas.openxmlformats.org/drawingml/2006/main" xmlns:r="http://schemas.openxmlformats.org/officeDocument/2006/relationships" xmlns:p="http://schemas.openxmlformats.org/presentationml/2006/main">
-  <p:cSld>
-    <p:spTree>
-      <p:nvGrpSpPr>
-        <p:cNvPr id="1" name=""/>
-        <p:cNvGrpSpPr/>
-        <p:nvPr/>
-      </p:nvGrpSpPr>
-      <p:grpSpPr>
-        <a:xfrm>
-          <a:off x="0" y="0"/>
-          <a:ext cx="0" cy="0"/>
-          <a:chOff x="0" y="0"/>
-          <a:chExt cx="0" cy="0"/>
-        </a:xfrm>
-      </p:grpSpPr>
-      <p:sp>
-        <p:nvSpPr>
-          <p:cNvPr id="3" name="Title 2"/>
-          <p:cNvSpPr>
-            <a:spLocks noGrp="1"/>
-          </p:cNvSpPr>
-          <p:nvPr>
-            <p:ph type="title"/>
-          </p:nvPr>
-        </p:nvSpPr>
-        <p:spPr>
-          <a:xfrm>
-            <a:off x="521207" y="448056"/>
-            <a:ext cx="11236028" cy="640080"/>
-          </a:xfrm>
-        </p:spPr>
-        <p:txBody>
-          <a:bodyPr>
-            <a:normAutofit fontScale="90000"/>
-          </a:bodyPr>
-          <a:lstStyle/>
-          <a:p>
-            <a:r>
-              <a:rPr lang="en-US" sz="2500" b="1" dirty="0">
-                <a:latin typeface="Segoe UI" panose="020B0502040204020203" pitchFamily="34" charset="0"/>
-                <a:cs typeface="Segoe UI" panose="020B0502040204020203" pitchFamily="34" charset="0"/>
-              </a:rPr>
-              <a:t>We created Initial MLR Model using automatic search procedures, However, the model failed to satisfy regression assumptions</a:t>
-            </a:r>
-          </a:p>
-        </p:txBody>
-      </p:sp>
-      <mc:AlternateContent xmlns:mc="http://schemas.openxmlformats.org/markup-compatibility/2006" xmlns:a14="http://schemas.microsoft.com/office/drawing/2010/main">
-        <mc:Choice Requires="a14">
-          <p:sp>
-            <p:nvSpPr>
-              <p:cNvPr id="8" name="Rectangle 7">
-                <a:extLst>
-                  <a:ext uri="{FF2B5EF4-FFF2-40B4-BE49-F238E27FC236}">
-                    <a16:creationId xmlns:a16="http://schemas.microsoft.com/office/drawing/2014/main" id="{9FD228F1-303D-4AC1-81C8-20CDB3468B3B}"/>
-                  </a:ext>
-                </a:extLst>
-              </p:cNvPr>
-              <p:cNvSpPr/>
-              <p:nvPr/>
-            </p:nvSpPr>
-            <p:spPr>
-              <a:xfrm>
-                <a:off x="799472" y="1307337"/>
-                <a:ext cx="5508496" cy="743473"/>
-              </a:xfrm>
-              <a:prstGeom prst="rect">
-                <a:avLst/>
-              </a:prstGeom>
-            </p:spPr>
-            <p:txBody>
-              <a:bodyPr wrap="square">
-                <a:spAutoFit/>
-              </a:bodyPr>
-              <a:lstStyle/>
-              <a:p>
-                <a:pPr marL="285750" indent="-285750">
-                  <a:spcAft>
-                    <a:spcPts val="2000"/>
-                  </a:spcAft>
-                  <a:buFont typeface="Arial" panose="020B0604020202020204" pitchFamily="34" charset="0"/>
-                  <a:buChar char="•"/>
-                </a:pPr>
-                <a:r>
-                  <a:rPr lang="en-US" sz="1400" dirty="0">
-                    <a:solidFill>
-                      <a:prstClr val="black">
-                        <a:lumMod val="75000"/>
-                        <a:lumOff val="25000"/>
-                      </a:prstClr>
-                    </a:solidFill>
-                    <a:latin typeface="Segoe UI" panose="020B0502040204020203" pitchFamily="34" charset="0"/>
-                    <a:cs typeface="Segoe UI" panose="020B0502040204020203" pitchFamily="34" charset="0"/>
-                  </a:rPr>
-                  <a:t>We choose full model as our initial model as automatic search functions with  highest </a:t>
-                </a:r>
-                <a:r>
-                  <a:rPr lang="en-US" sz="1400" b="1" dirty="0">
-                    <a:solidFill>
-                      <a:srgbClr val="D24726"/>
-                    </a:solidFill>
-                    <a:latin typeface="Segoe UI" panose="020B0502040204020203" pitchFamily="34" charset="0"/>
-                    <a:cs typeface="Segoe UI" panose="020B0502040204020203" pitchFamily="34" charset="0"/>
-                  </a:rPr>
-                  <a:t>adjusted </a:t>
-                </a:r>
-                <a14:m>
-                  <m:oMath xmlns:m="http://schemas.openxmlformats.org/officeDocument/2006/math">
-                    <m:sSup>
-                      <m:sSupPr>
-                        <m:ctrlPr>
-                          <a:rPr lang="en-US" sz="1400" b="1" i="1" dirty="0" smtClean="0">
-                            <a:solidFill>
-                              <a:srgbClr val="D24726"/>
-                            </a:solidFill>
-                            <a:latin typeface="Cambria Math" panose="02040503050406030204" pitchFamily="18" charset="0"/>
-                            <a:cs typeface="Segoe UI" panose="020B0502040204020203" pitchFamily="34" charset="0"/>
-                          </a:rPr>
-                        </m:ctrlPr>
-                      </m:sSupPr>
-                      <m:e>
-                        <m:r>
-                          <a:rPr lang="en-US" sz="1400" b="1" i="1" dirty="0" smtClean="0">
-                            <a:solidFill>
-                              <a:srgbClr val="D24726"/>
-                            </a:solidFill>
-                            <a:latin typeface="Cambria Math" panose="02040503050406030204" pitchFamily="18" charset="0"/>
-                            <a:cs typeface="Segoe UI" panose="020B0502040204020203" pitchFamily="34" charset="0"/>
-                          </a:rPr>
-                          <m:t>𝑹</m:t>
-                        </m:r>
-                      </m:e>
-                      <m:sup>
-                        <m:r>
-                          <a:rPr lang="en-US" sz="1400" b="1" i="1" dirty="0" smtClean="0">
-                            <a:solidFill>
-                              <a:srgbClr val="D24726"/>
-                            </a:solidFill>
-                            <a:latin typeface="Cambria Math" panose="02040503050406030204" pitchFamily="18" charset="0"/>
-                            <a:cs typeface="Segoe UI" panose="020B0502040204020203" pitchFamily="34" charset="0"/>
-                          </a:rPr>
-                          <m:t>𝟐</m:t>
-                        </m:r>
-                      </m:sup>
-                    </m:sSup>
-                  </m:oMath>
-                </a14:m>
-                <a:r>
-                  <a:rPr lang="en-US" sz="1400" dirty="0">
-                    <a:solidFill>
-                      <a:prstClr val="black">
-                        <a:lumMod val="75000"/>
-                        <a:lumOff val="25000"/>
-                      </a:prstClr>
-                    </a:solidFill>
-                    <a:latin typeface="Segoe UI" panose="020B0502040204020203" pitchFamily="34" charset="0"/>
-                    <a:cs typeface="Segoe UI" panose="020B0502040204020203" pitchFamily="34" charset="0"/>
-                  </a:rPr>
-                  <a:t>  &amp; </a:t>
-                </a:r>
-                <a:r>
-                  <a:rPr lang="en-US" sz="1400" b="1" dirty="0">
-                    <a:solidFill>
-                      <a:srgbClr val="D24726"/>
-                    </a:solidFill>
-                    <a:latin typeface="Segoe UI" panose="020B0502040204020203" pitchFamily="34" charset="0"/>
-                    <a:cs typeface="Segoe UI" panose="020B0502040204020203" pitchFamily="34" charset="0"/>
-                  </a:rPr>
-                  <a:t>lowest BIC </a:t>
-                </a:r>
-                <a:r>
-                  <a:rPr lang="en-US" sz="1400" dirty="0">
-                    <a:solidFill>
-                      <a:prstClr val="black">
-                        <a:lumMod val="75000"/>
-                        <a:lumOff val="25000"/>
-                      </a:prstClr>
-                    </a:solidFill>
-                    <a:latin typeface="Segoe UI" panose="020B0502040204020203" pitchFamily="34" charset="0"/>
-                    <a:cs typeface="Segoe UI" panose="020B0502040204020203" pitchFamily="34" charset="0"/>
-                  </a:rPr>
-                  <a:t>results were different : </a:t>
-                </a:r>
-              </a:p>
-            </p:txBody>
-          </p:sp>
-        </mc:Choice>
-        <mc:Fallback xmlns="">
-          <p:sp>
-            <p:nvSpPr>
-              <p:cNvPr id="8" name="Rectangle 7">
-                <a:extLst>
-                  <a:ext uri="{FF2B5EF4-FFF2-40B4-BE49-F238E27FC236}">
-                    <a16:creationId xmlns:a16="http://schemas.microsoft.com/office/drawing/2014/main" id="{9FD228F1-303D-4AC1-81C8-20CDB3468B3B}"/>
-                  </a:ext>
-                </a:extLst>
-              </p:cNvPr>
-              <p:cNvSpPr>
-                <a:spLocks noRot="1" noChangeAspect="1" noMove="1" noResize="1" noEditPoints="1" noAdjustHandles="1" noChangeArrowheads="1" noChangeShapeType="1" noTextEdit="1"/>
-              </p:cNvSpPr>
-              <p:nvPr/>
-            </p:nvSpPr>
-            <p:spPr>
-              <a:xfrm>
-                <a:off x="799472" y="1307337"/>
-                <a:ext cx="5508496" cy="743473"/>
-              </a:xfrm>
-              <a:prstGeom prst="rect">
-                <a:avLst/>
-              </a:prstGeom>
-              <a:blipFill>
-                <a:blip r:embed="rId2"/>
-                <a:stretch>
-                  <a:fillRect l="-111" t="-1639" b="-7377"/>
-                </a:stretch>
-              </a:blipFill>
-            </p:spPr>
-            <p:txBody>
-              <a:bodyPr/>
-              <a:lstStyle/>
-              <a:p>
-                <a:r>
-                  <a:rPr lang="en-US">
-                    <a:noFill/>
-                  </a:rPr>
-                  <a:t> </a:t>
-                </a:r>
-              </a:p>
-            </p:txBody>
-          </p:sp>
-        </mc:Fallback>
-      </mc:AlternateContent>
-      <p:pic>
-        <p:nvPicPr>
-          <p:cNvPr id="4" name="Picture 3">
-            <a:extLst>
-              <a:ext uri="{FF2B5EF4-FFF2-40B4-BE49-F238E27FC236}">
-                <a16:creationId xmlns:a16="http://schemas.microsoft.com/office/drawing/2014/main" id="{A5B13257-D272-43C2-A19A-A8F0EA9FE153}"/>
-              </a:ext>
-            </a:extLst>
-          </p:cNvPr>
-          <p:cNvPicPr>
-            <a:picLocks noChangeAspect="1"/>
-          </p:cNvPicPr>
-          <p:nvPr/>
-        </p:nvPicPr>
-        <p:blipFill>
-          <a:blip r:embed="rId3"/>
-          <a:stretch>
-            <a:fillRect/>
-          </a:stretch>
-        </p:blipFill>
-        <p:spPr>
-          <a:xfrm>
-            <a:off x="6920672" y="1508528"/>
-            <a:ext cx="4099883" cy="3463371"/>
-          </a:xfrm>
-          <a:prstGeom prst="rect">
-            <a:avLst/>
-          </a:prstGeom>
-        </p:spPr>
-      </p:pic>
-      <p:sp>
-        <p:nvSpPr>
-          <p:cNvPr id="17" name="TextBox 16">
-            <a:extLst>
-              <a:ext uri="{FF2B5EF4-FFF2-40B4-BE49-F238E27FC236}">
-                <a16:creationId xmlns:a16="http://schemas.microsoft.com/office/drawing/2014/main" id="{73DED339-C5AA-4512-82B2-2668600B63F2}"/>
-              </a:ext>
-            </a:extLst>
-          </p:cNvPr>
-          <p:cNvSpPr txBox="1"/>
-          <p:nvPr/>
-        </p:nvSpPr>
-        <p:spPr>
-          <a:xfrm>
-            <a:off x="6139221" y="5163807"/>
-            <a:ext cx="5871863" cy="1169551"/>
-          </a:xfrm>
-          <a:prstGeom prst="rect">
-            <a:avLst/>
-          </a:prstGeom>
-          <a:noFill/>
-        </p:spPr>
-        <p:txBody>
-          <a:bodyPr wrap="square" rtlCol="0">
-            <a:spAutoFit/>
-          </a:bodyPr>
-          <a:lstStyle/>
-          <a:p>
-            <a:r>
-              <a:rPr lang="en-US" sz="1400" dirty="0">
-                <a:solidFill>
-                  <a:schemeClr val="tx1">
-                    <a:lumMod val="65000"/>
-                    <a:lumOff val="35000"/>
-                  </a:schemeClr>
-                </a:solidFill>
-              </a:rPr>
-              <a:t>From the plots, we can infer that our transformed model</a:t>
-            </a:r>
-          </a:p>
-          <a:p>
-            <a:pPr marL="285750" indent="-285750">
-              <a:buFont typeface="Arial" panose="020B0604020202020204" pitchFamily="34" charset="0"/>
-              <a:buChar char="•"/>
-            </a:pPr>
-            <a:r>
-              <a:rPr lang="en-US" sz="1400" dirty="0">
-                <a:solidFill>
-                  <a:schemeClr val="tx1">
-                    <a:lumMod val="65000"/>
-                    <a:lumOff val="35000"/>
-                  </a:schemeClr>
-                </a:solidFill>
-              </a:rPr>
-              <a:t>We can see </a:t>
-            </a:r>
-            <a:r>
-              <a:rPr lang="en-US" sz="1400" b="1" dirty="0">
-                <a:solidFill>
-                  <a:srgbClr val="D24726"/>
-                </a:solidFill>
-              </a:rPr>
-              <a:t>Non-constant variance </a:t>
-            </a:r>
-            <a:r>
-              <a:rPr lang="en-US" sz="1400" dirty="0">
-                <a:solidFill>
-                  <a:schemeClr val="tx1">
-                    <a:lumMod val="65000"/>
-                    <a:lumOff val="35000"/>
-                  </a:schemeClr>
-                </a:solidFill>
-              </a:rPr>
-              <a:t>as seen in the box-cox plot.</a:t>
-            </a:r>
-          </a:p>
-          <a:p>
-            <a:pPr marL="285750" indent="-285750">
-              <a:buFont typeface="Arial" panose="020B0604020202020204" pitchFamily="34" charset="0"/>
-              <a:buChar char="•"/>
-            </a:pPr>
-            <a:r>
-              <a:rPr lang="en-US" sz="1400" dirty="0">
-                <a:solidFill>
-                  <a:schemeClr val="tx1">
-                    <a:lumMod val="65000"/>
-                    <a:lumOff val="35000"/>
-                  </a:schemeClr>
-                </a:solidFill>
-              </a:rPr>
-              <a:t>And </a:t>
-            </a:r>
-            <a:r>
-              <a:rPr lang="en-US" sz="1400" b="1" dirty="0">
-                <a:solidFill>
-                  <a:srgbClr val="D24726"/>
-                </a:solidFill>
-              </a:rPr>
-              <a:t>Non-linear relationship</a:t>
-            </a:r>
-            <a:r>
-              <a:rPr lang="en-US" sz="1400" dirty="0">
-                <a:solidFill>
-                  <a:srgbClr val="D24726"/>
-                </a:solidFill>
-              </a:rPr>
-              <a:t> </a:t>
-            </a:r>
-            <a:r>
-              <a:rPr lang="en-US" sz="1400" dirty="0">
-                <a:solidFill>
-                  <a:schemeClr val="tx1">
-                    <a:lumMod val="65000"/>
-                    <a:lumOff val="35000"/>
-                  </a:schemeClr>
-                </a:solidFill>
-              </a:rPr>
-              <a:t>between y &amp; </a:t>
-            </a:r>
-            <a:r>
-              <a:rPr lang="en-US" sz="1400" dirty="0" err="1">
-                <a:solidFill>
-                  <a:schemeClr val="tx1">
-                    <a:lumMod val="65000"/>
-                    <a:lumOff val="35000"/>
-                  </a:schemeClr>
-                </a:solidFill>
-              </a:rPr>
-              <a:t>Xs</a:t>
-            </a:r>
-            <a:r>
-              <a:rPr lang="en-US" sz="1400" dirty="0">
-                <a:solidFill>
-                  <a:schemeClr val="tx1">
-                    <a:lumMod val="65000"/>
-                    <a:lumOff val="35000"/>
-                  </a:schemeClr>
-                </a:solidFill>
-              </a:rPr>
-              <a:t> is seen in the residual plot.</a:t>
-            </a:r>
-          </a:p>
-          <a:p>
-            <a:pPr marL="285750" indent="-285750">
-              <a:buFont typeface="Arial" panose="020B0604020202020204" pitchFamily="34" charset="0"/>
-              <a:buChar char="•"/>
-            </a:pPr>
-            <a:r>
-              <a:rPr lang="en-US" sz="1400" b="1" dirty="0">
-                <a:solidFill>
-                  <a:srgbClr val="D24726"/>
-                </a:solidFill>
-              </a:rPr>
-              <a:t>Heavy tails </a:t>
-            </a:r>
-            <a:r>
-              <a:rPr lang="en-US" sz="1400" dirty="0">
-                <a:solidFill>
-                  <a:schemeClr val="tx1">
-                    <a:lumMod val="65000"/>
-                    <a:lumOff val="35000"/>
-                  </a:schemeClr>
-                </a:solidFill>
-              </a:rPr>
-              <a:t>in normal Q-Q plot indicate the data is skewed.</a:t>
-            </a:r>
-          </a:p>
-        </p:txBody>
-      </p:sp>
-      <p:sp>
-        <p:nvSpPr>
-          <p:cNvPr id="20" name="TextBox 19">
-            <a:extLst>
-              <a:ext uri="{FF2B5EF4-FFF2-40B4-BE49-F238E27FC236}">
-                <a16:creationId xmlns:a16="http://schemas.microsoft.com/office/drawing/2014/main" id="{ED73FA6D-4A29-4572-B898-998968CB6A90}"/>
-              </a:ext>
-            </a:extLst>
-          </p:cNvPr>
-          <p:cNvSpPr txBox="1"/>
-          <p:nvPr/>
-        </p:nvSpPr>
-        <p:spPr>
-          <a:xfrm>
-            <a:off x="756378" y="5756758"/>
-            <a:ext cx="5259168" cy="738664"/>
-          </a:xfrm>
-          <a:prstGeom prst="rect">
-            <a:avLst/>
-          </a:prstGeom>
-          <a:noFill/>
-        </p:spPr>
-        <p:txBody>
-          <a:bodyPr wrap="square" rtlCol="0">
-            <a:spAutoFit/>
-          </a:bodyPr>
-          <a:lstStyle/>
-          <a:p>
-            <a:r>
-              <a:rPr lang="en-US" sz="1400" dirty="0">
-                <a:solidFill>
-                  <a:schemeClr val="tx1">
-                    <a:lumMod val="65000"/>
-                    <a:lumOff val="35000"/>
-                  </a:schemeClr>
-                </a:solidFill>
-              </a:rPr>
-              <a:t>We need to transform y to address </a:t>
-            </a:r>
-            <a:r>
-              <a:rPr lang="en-US" sz="1400" b="1" dirty="0">
-                <a:solidFill>
-                  <a:srgbClr val="D24726"/>
-                </a:solidFill>
-              </a:rPr>
-              <a:t>Non-constant variance </a:t>
-            </a:r>
-            <a:r>
-              <a:rPr lang="en-US" sz="1400" dirty="0">
-                <a:solidFill>
-                  <a:schemeClr val="tx1">
-                    <a:lumMod val="65000"/>
-                    <a:lumOff val="35000"/>
-                  </a:schemeClr>
-                </a:solidFill>
-              </a:rPr>
-              <a:t> then test assumptions again, transform x to address </a:t>
-            </a:r>
-            <a:r>
-              <a:rPr lang="en-US" sz="1400" b="1" dirty="0">
-                <a:solidFill>
-                  <a:srgbClr val="D24726"/>
-                </a:solidFill>
-              </a:rPr>
-              <a:t>Non-linearity</a:t>
-            </a:r>
-            <a:r>
-              <a:rPr lang="en-US" sz="1400" dirty="0">
-                <a:solidFill>
-                  <a:srgbClr val="D24726"/>
-                </a:solidFill>
-              </a:rPr>
-              <a:t> </a:t>
-            </a:r>
-            <a:r>
-              <a:rPr lang="en-US" sz="1400" dirty="0">
-                <a:solidFill>
-                  <a:schemeClr val="tx1">
-                    <a:lumMod val="65000"/>
-                    <a:lumOff val="35000"/>
-                  </a:schemeClr>
-                </a:solidFill>
-              </a:rPr>
-              <a:t>if it is still an issue</a:t>
-            </a:r>
-          </a:p>
-        </p:txBody>
-      </p:sp>
-      <p:pic>
-        <p:nvPicPr>
-          <p:cNvPr id="22" name="Picture 21">
-            <a:extLst>
-              <a:ext uri="{FF2B5EF4-FFF2-40B4-BE49-F238E27FC236}">
-                <a16:creationId xmlns:a16="http://schemas.microsoft.com/office/drawing/2014/main" id="{4F0FB3BA-B190-4939-B6C2-4B1AB085C00E}"/>
-              </a:ext>
-            </a:extLst>
-          </p:cNvPr>
-          <p:cNvPicPr>
-            <a:picLocks noChangeAspect="1"/>
-          </p:cNvPicPr>
-          <p:nvPr/>
-        </p:nvPicPr>
-        <p:blipFill>
-          <a:blip r:embed="rId4"/>
-          <a:stretch>
-            <a:fillRect/>
-          </a:stretch>
-        </p:blipFill>
-        <p:spPr>
-          <a:xfrm>
-            <a:off x="521207" y="2100243"/>
-            <a:ext cx="5981507" cy="499067"/>
-          </a:xfrm>
-          <a:prstGeom prst="rect">
-            <a:avLst/>
-          </a:prstGeom>
-        </p:spPr>
-      </p:pic>
-      <p:pic>
-        <p:nvPicPr>
-          <p:cNvPr id="24" name="Picture 23">
-            <a:extLst>
-              <a:ext uri="{FF2B5EF4-FFF2-40B4-BE49-F238E27FC236}">
-                <a16:creationId xmlns:a16="http://schemas.microsoft.com/office/drawing/2014/main" id="{3BAEAB8D-E8C6-4046-B6A3-7064A4137357}"/>
-              </a:ext>
-            </a:extLst>
-          </p:cNvPr>
-          <p:cNvPicPr>
-            <a:picLocks noChangeAspect="1"/>
-          </p:cNvPicPr>
-          <p:nvPr/>
-        </p:nvPicPr>
-        <p:blipFill>
-          <a:blip r:embed="rId5"/>
-          <a:stretch>
-            <a:fillRect/>
-          </a:stretch>
-        </p:blipFill>
-        <p:spPr>
-          <a:xfrm>
-            <a:off x="1356059" y="2693370"/>
-            <a:ext cx="3783568" cy="2852278"/>
-          </a:xfrm>
-          <a:prstGeom prst="rect">
-            <a:avLst/>
-          </a:prstGeom>
-        </p:spPr>
-      </p:pic>
-    </p:spTree>
-    <p:extLst>
-      <p:ext uri="{BB962C8B-B14F-4D97-AF65-F5344CB8AC3E}">
-        <p14:creationId xmlns:p14="http://schemas.microsoft.com/office/powerpoint/2010/main" val="517865610"/>
       </p:ext>
     </p:extLst>
   </p:cSld>
@@ -9789,15 +10196,6 @@
 </file>
 
 <file path=customXml/item1.xml><?xml version="1.0" encoding="utf-8"?>
-<p:properties xmlns:p="http://schemas.microsoft.com/office/2006/metadata/properties" xmlns:xsi="http://www.w3.org/2001/XMLSchema-instance" xmlns:pc="http://schemas.microsoft.com/office/infopath/2007/PartnerControls">
-  <documentManagement>
-    <Status xmlns="71af3243-3dd4-4a8d-8c0d-dd76da1f02a5">Not started</Status>
-    <MediaServiceKeyPoints xmlns="71af3243-3dd4-4a8d-8c0d-dd76da1f02a5" xsi:nil="true"/>
-  </documentManagement>
-</p:properties>
-</file>
-
-<file path=customXml/item2.xml><?xml version="1.0" encoding="utf-8"?>
 <?mso-contentType ?>
 <FormTemplates xmlns="http://schemas.microsoft.com/sharepoint/v3/contenttype/forms">
   <Display>DocumentLibraryForm</Display>
@@ -9806,7 +10204,7 @@
 </FormTemplates>
 </file>
 
-<file path=customXml/item3.xml><?xml version="1.0" encoding="utf-8"?>
+<file path=customXml/item2.xml><?xml version="1.0" encoding="utf-8"?>
 <ct:contentTypeSchema xmlns:ct="http://schemas.microsoft.com/office/2006/metadata/contentType" xmlns:ma="http://schemas.microsoft.com/office/2006/metadata/properties/metaAttributes" ct:_="" ma:_="" ma:contentTypeName="Document" ma:contentTypeID="0x01010079F111ED35F8CC479449609E8A0923A6" ma:contentTypeVersion="12" ma:contentTypeDescription="Create a new document." ma:contentTypeScope="" ma:versionID="a8a52e8c320b9a064ae3583ae3861c92">
   <xsd:schema xmlns:xsd="http://www.w3.org/2001/XMLSchema" xmlns:xs="http://www.w3.org/2001/XMLSchema" xmlns:p="http://schemas.microsoft.com/office/2006/metadata/properties" xmlns:ns2="71af3243-3dd4-4a8d-8c0d-dd76da1f02a5" xmlns:ns3="16c05727-aa75-4e4a-9b5f-8a80a1165891" targetNamespace="http://schemas.microsoft.com/office/2006/metadata/properties" ma:root="true" ma:fieldsID="88020cb39231a0945110f9cd888b521a" ns2:_="" ns3:_="">
     <xsd:import namespace="71af3243-3dd4-4a8d-8c0d-dd76da1f02a5"/>
@@ -10027,17 +10425,16 @@
 </ct:contentTypeSchema>
 </file>
 
-<file path=customXml/itemProps1.xml><?xml version="1.0" encoding="utf-8"?>
-<ds:datastoreItem xmlns:ds="http://schemas.openxmlformats.org/officeDocument/2006/customXml" ds:itemID="{950072C5-DDE0-4258-BA7A-4D4B80DFA632}">
-  <ds:schemaRefs>
-    <ds:schemaRef ds:uri="http://schemas.microsoft.com/office/2006/metadata/properties"/>
-    <ds:schemaRef ds:uri="http://schemas.microsoft.com/office/infopath/2007/PartnerControls"/>
-    <ds:schemaRef ds:uri="71af3243-3dd4-4a8d-8c0d-dd76da1f02a5"/>
-  </ds:schemaRefs>
-</ds:datastoreItem>
+<file path=customXml/item3.xml><?xml version="1.0" encoding="utf-8"?>
+<p:properties xmlns:p="http://schemas.microsoft.com/office/2006/metadata/properties" xmlns:xsi="http://www.w3.org/2001/XMLSchema-instance" xmlns:pc="http://schemas.microsoft.com/office/infopath/2007/PartnerControls">
+  <documentManagement>
+    <Status xmlns="71af3243-3dd4-4a8d-8c0d-dd76da1f02a5">Not started</Status>
+    <MediaServiceKeyPoints xmlns="71af3243-3dd4-4a8d-8c0d-dd76da1f02a5" xsi:nil="true"/>
+  </documentManagement>
+</p:properties>
 </file>
 
-<file path=customXml/itemProps2.xml><?xml version="1.0" encoding="utf-8"?>
+<file path=customXml/itemProps1.xml><?xml version="1.0" encoding="utf-8"?>
 <ds:datastoreItem xmlns:ds="http://schemas.openxmlformats.org/officeDocument/2006/customXml" ds:itemID="{7EE8C63A-4744-4DE4-BB49-0FF0B5375C60}">
   <ds:schemaRefs>
     <ds:schemaRef ds:uri="http://schemas.microsoft.com/sharepoint/v3/contenttype/forms"/>
@@ -10045,7 +10442,7 @@
 </ds:datastoreItem>
 </file>
 
-<file path=customXml/itemProps3.xml><?xml version="1.0" encoding="utf-8"?>
+<file path=customXml/itemProps2.xml><?xml version="1.0" encoding="utf-8"?>
 <ds:datastoreItem xmlns:ds="http://schemas.openxmlformats.org/officeDocument/2006/customXml" ds:itemID="{FD7FC771-7DFE-49DA-B577-71181BFBCB2E}">
   <ds:schemaRefs>
     <ds:schemaRef ds:uri="http://schemas.microsoft.com/office/2006/metadata/contentType"/>
@@ -10062,4 +10459,14 @@
     <ds:schemaRef ds:uri="http://schemas.microsoft.com/internal/obd"/>
   </ds:schemaRefs>
 </ds:datastoreItem>
+</file>
+
+<file path=customXml/itemProps3.xml><?xml version="1.0" encoding="utf-8"?>
+<ds:datastoreItem xmlns:ds="http://schemas.openxmlformats.org/officeDocument/2006/customXml" ds:itemID="{950072C5-DDE0-4258-BA7A-4D4B80DFA632}">
+  <ds:schemaRefs>
+    <ds:schemaRef ds:uri="http://schemas.microsoft.com/office/2006/metadata/properties"/>
+    <ds:schemaRef ds:uri="http://schemas.microsoft.com/office/infopath/2007/PartnerControls"/>
+    <ds:schemaRef ds:uri="71af3243-3dd4-4a8d-8c0d-dd76da1f02a5"/>
+  </ds:schemaRefs>
+</ds:datastoreItem>
 </file>
</xml_diff>